<commit_message>
fixed overlapping text my image was too fat edited text TODO: we have space, add one more flip chart that shows an intermediate stage in the block pushing where the swarm goes to a corner.  Add text that explains why he to this move. 2.)  put video on YouTUbe and add a link
</commit_message>
<xml_diff>
--- a/Presentations/Poster-Dallas.pptx
+++ b/Presentations/Poster-Dallas.pptx
@@ -106,7 +106,7 @@
   </p:defaultTextStyle>
   <p:extLst>
     <p:ext uri="{EFAFB233-063F-42B5-8137-9DF3F51BA10A}">
-      <p15:sldGuideLst xmlns="" xmlns:p15="http://schemas.microsoft.com/office/powerpoint/2012/main">
+      <p15:sldGuideLst xmlns:p15="http://schemas.microsoft.com/office/powerpoint/2012/main" xmlns="">
         <p15:guide id="1" orient="horz" pos="10368">
           <p15:clr>
             <a:srgbClr val="A4A3A4"/>
@@ -305,7 +305,7 @@
             <a:fld id="{ADAD3B8D-529A-B648-B3A5-128BFC9F5CF8}" type="datetimeFigureOut">
               <a:rPr lang="en-US" smtClean="0"/>
               <a:pPr/>
-              <a:t>3/24/15</a:t>
+              <a:t>3/26/15</a:t>
             </a:fld>
             <a:endParaRPr lang="en-US"/>
           </a:p>
@@ -477,7 +477,7 @@
             <a:fld id="{ADAD3B8D-529A-B648-B3A5-128BFC9F5CF8}" type="datetimeFigureOut">
               <a:rPr lang="en-US" smtClean="0"/>
               <a:pPr/>
-              <a:t>3/24/15</a:t>
+              <a:t>3/26/15</a:t>
             </a:fld>
             <a:endParaRPr lang="en-US"/>
           </a:p>
@@ -659,7 +659,7 @@
             <a:fld id="{ADAD3B8D-529A-B648-B3A5-128BFC9F5CF8}" type="datetimeFigureOut">
               <a:rPr lang="en-US" smtClean="0"/>
               <a:pPr/>
-              <a:t>3/24/15</a:t>
+              <a:t>3/26/15</a:t>
             </a:fld>
             <a:endParaRPr lang="en-US"/>
           </a:p>
@@ -831,7 +831,7 @@
             <a:fld id="{ADAD3B8D-529A-B648-B3A5-128BFC9F5CF8}" type="datetimeFigureOut">
               <a:rPr lang="en-US" smtClean="0"/>
               <a:pPr/>
-              <a:t>3/24/15</a:t>
+              <a:t>3/26/15</a:t>
             </a:fld>
             <a:endParaRPr lang="en-US"/>
           </a:p>
@@ -1079,7 +1079,7 @@
             <a:fld id="{ADAD3B8D-529A-B648-B3A5-128BFC9F5CF8}" type="datetimeFigureOut">
               <a:rPr lang="en-US" smtClean="0"/>
               <a:pPr/>
-              <a:t>3/24/15</a:t>
+              <a:t>3/26/15</a:t>
             </a:fld>
             <a:endParaRPr lang="en-US"/>
           </a:p>
@@ -1369,7 +1369,7 @@
             <a:fld id="{ADAD3B8D-529A-B648-B3A5-128BFC9F5CF8}" type="datetimeFigureOut">
               <a:rPr lang="en-US" smtClean="0"/>
               <a:pPr/>
-              <a:t>3/24/15</a:t>
+              <a:t>3/26/15</a:t>
             </a:fld>
             <a:endParaRPr lang="en-US"/>
           </a:p>
@@ -1793,7 +1793,7 @@
             <a:fld id="{ADAD3B8D-529A-B648-B3A5-128BFC9F5CF8}" type="datetimeFigureOut">
               <a:rPr lang="en-US" smtClean="0"/>
               <a:pPr/>
-              <a:t>3/24/15</a:t>
+              <a:t>3/26/15</a:t>
             </a:fld>
             <a:endParaRPr lang="en-US"/>
           </a:p>
@@ -1913,7 +1913,7 @@
             <a:fld id="{ADAD3B8D-529A-B648-B3A5-128BFC9F5CF8}" type="datetimeFigureOut">
               <a:rPr lang="en-US" smtClean="0"/>
               <a:pPr/>
-              <a:t>3/24/15</a:t>
+              <a:t>3/26/15</a:t>
             </a:fld>
             <a:endParaRPr lang="en-US"/>
           </a:p>
@@ -2010,7 +2010,7 @@
             <a:fld id="{ADAD3B8D-529A-B648-B3A5-128BFC9F5CF8}" type="datetimeFigureOut">
               <a:rPr lang="en-US" smtClean="0"/>
               <a:pPr/>
-              <a:t>3/24/15</a:t>
+              <a:t>3/26/15</a:t>
             </a:fld>
             <a:endParaRPr lang="en-US"/>
           </a:p>
@@ -2289,7 +2289,7 @@
             <a:fld id="{ADAD3B8D-529A-B648-B3A5-128BFC9F5CF8}" type="datetimeFigureOut">
               <a:rPr lang="en-US" smtClean="0"/>
               <a:pPr/>
-              <a:t>3/24/15</a:t>
+              <a:t>3/26/15</a:t>
             </a:fld>
             <a:endParaRPr lang="en-US"/>
           </a:p>
@@ -2544,7 +2544,7 @@
             <a:fld id="{ADAD3B8D-529A-B648-B3A5-128BFC9F5CF8}" type="datetimeFigureOut">
               <a:rPr lang="en-US" smtClean="0"/>
               <a:pPr/>
-              <a:t>3/24/15</a:t>
+              <a:t>3/26/15</a:t>
             </a:fld>
             <a:endParaRPr lang="en-US"/>
           </a:p>
@@ -2759,7 +2759,7 @@
             <a:fld id="{ADAD3B8D-529A-B648-B3A5-128BFC9F5CF8}" type="datetimeFigureOut">
               <a:rPr lang="en-US" smtClean="0"/>
               <a:pPr/>
-              <a:t>3/24/15</a:t>
+              <a:t>3/26/15</a:t>
             </a:fld>
             <a:endParaRPr lang="en-US"/>
           </a:p>
@@ -3137,6 +3137,36 @@
       </p:grpSpPr>
       <p:pic>
         <p:nvPicPr>
+          <p:cNvPr id="376" name="Picture 375"/>
+          <p:cNvPicPr>
+            <a:picLocks noChangeAspect="1"/>
+          </p:cNvPicPr>
+          <p:nvPr/>
+        </p:nvPicPr>
+        <p:blipFill>
+          <a:blip r:embed="rId2">
+            <a:extLst>
+              <a:ext uri="{28A0092B-C50C-407E-A947-70E740481C1C}">
+                <a14:useLocalDpi xmlns:a14="http://schemas.microsoft.com/office/drawing/2010/main" val="0"/>
+              </a:ext>
+            </a:extLst>
+          </a:blip>
+          <a:stretch>
+            <a:fillRect/>
+          </a:stretch>
+        </p:blipFill>
+        <p:spPr>
+          <a:xfrm>
+            <a:off x="34361752" y="2448988"/>
+            <a:ext cx="1640003" cy="1615305"/>
+          </a:xfrm>
+          <a:prstGeom prst="rect">
+            <a:avLst/>
+          </a:prstGeom>
+        </p:spPr>
+      </p:pic>
+      <p:pic>
+        <p:nvPicPr>
           <p:cNvPr id="361" name="Picture 5" descr="C:\Users\atbecker\Downloads\qrcode.26864831.png"/>
           <p:cNvPicPr>
             <a:picLocks noChangeAspect="1" noChangeArrowheads="1"/>
@@ -3144,7 +3174,7 @@
           <p:nvPr/>
         </p:nvPicPr>
         <p:blipFill>
-          <a:blip r:embed="rId2">
+          <a:blip r:embed="rId3">
             <a:extLst>
               <a:ext uri="{28A0092B-C50C-407E-A947-70E740481C1C}">
                 <a14:useLocalDpi xmlns:a14="http://schemas.microsoft.com/office/drawing/2010/main" val="0"/>
@@ -3311,10 +3341,6 @@
               </a:rPr>
               <a:t> Inputs</a:t>
             </a:r>
-            <a:endParaRPr lang="en-US" b="1" dirty="0" smtClean="0">
-              <a:latin typeface="Arial"/>
-              <a:cs typeface="Arial"/>
-            </a:endParaRPr>
           </a:p>
           <a:p>
             <a:pPr algn="ctr"/>
@@ -3323,14 +3349,7 @@
                 <a:latin typeface="Arial"/>
                 <a:cs typeface="Arial"/>
               </a:rPr>
-              <a:t>Shiva </a:t>
-            </a:r>
-            <a:r>
-              <a:rPr lang="en-US" sz="5000" dirty="0" smtClean="0">
-                <a:latin typeface="Arial"/>
-                <a:cs typeface="Arial"/>
-              </a:rPr>
-              <a:t>Shahrokhi, Aaron T. Becker</a:t>
+              <a:t>Shiva Shahrokhi, Aaron T. Becker</a:t>
             </a:r>
           </a:p>
           <a:p>
@@ -3339,52 +3358,32 @@
               <a:rPr lang="en-US" sz="3200" dirty="0" smtClean="0">
                 <a:latin typeface="Arial"/>
                 <a:cs typeface="Arial"/>
-                <a:hlinkClick r:id="rId3"/>
-              </a:rPr>
-              <a:t>  sshahrokhi2</a:t>
+                <a:hlinkClick r:id="rId4"/>
+              </a:rPr>
+              <a:t>  sshahrokhi2@uh.edu</a:t>
             </a:r>
             <a:r>
               <a:rPr lang="en-US" sz="3200" dirty="0" smtClean="0">
                 <a:latin typeface="Arial"/>
                 <a:cs typeface="Arial"/>
-                <a:hlinkClick r:id="rId3"/>
-              </a:rPr>
-              <a:t>@uh.edu</a:t>
+              </a:rPr>
+              <a:t>,  </a:t>
             </a:r>
             <a:r>
               <a:rPr lang="en-US" sz="3200" dirty="0" smtClean="0">
                 <a:latin typeface="Arial"/>
                 <a:cs typeface="Arial"/>
-              </a:rPr>
-              <a:t>,  </a:t>
+                <a:hlinkClick r:id="rId5"/>
+              </a:rPr>
+              <a:t>atbecker@uh.edu</a:t>
             </a:r>
             <a:r>
               <a:rPr lang="en-US" sz="3200" dirty="0" smtClean="0">
                 <a:latin typeface="Arial"/>
                 <a:cs typeface="Arial"/>
-                <a:hlinkClick r:id="rId4"/>
-              </a:rPr>
-              <a:t>atbecker@</a:t>
-            </a:r>
-            <a:r>
-              <a:rPr lang="en-US" sz="3200" dirty="0" smtClean="0">
-                <a:latin typeface="Arial"/>
-                <a:cs typeface="Arial"/>
-                <a:hlinkClick r:id="rId4"/>
-              </a:rPr>
-              <a:t>uh.edu</a:t>
-            </a:r>
-            <a:r>
-              <a:rPr lang="en-US" sz="3200" dirty="0" smtClean="0">
-                <a:latin typeface="Arial"/>
-                <a:cs typeface="Arial"/>
               </a:rPr>
               <a:t>     .      </a:t>
             </a:r>
-            <a:endParaRPr lang="en-US" sz="3200" dirty="0" smtClean="0">
-              <a:latin typeface="Arial"/>
-              <a:cs typeface="Arial"/>
-            </a:endParaRPr>
           </a:p>
           <a:p>
             <a:pPr algn="ctr"/>
@@ -3629,10 +3628,6 @@
               </a:rPr>
               <a:t>	</a:t>
             </a:r>
-            <a:endParaRPr lang="en-US" sz="4000" dirty="0" smtClean="0">
-              <a:latin typeface="Arial"/>
-              <a:cs typeface="Arial"/>
-            </a:endParaRPr>
           </a:p>
           <a:p>
             <a:endParaRPr lang="en-US" sz="4000" b="1" dirty="0" smtClean="0">
@@ -3916,10 +3911,6 @@
               </a:rPr>
               <a:t>Three Controllers</a:t>
             </a:r>
-            <a:endParaRPr lang="en-US" sz="6500" dirty="0" smtClean="0">
-              <a:latin typeface="Arial"/>
-              <a:cs typeface="Arial"/>
-            </a:endParaRPr>
           </a:p>
         </p:txBody>
       </p:sp>
@@ -4186,10 +4177,6 @@
               </a:rPr>
               <a:t>Opportunities</a:t>
             </a:r>
-            <a:endParaRPr lang="en-US" sz="7000" dirty="0" smtClean="0">
-              <a:latin typeface="Arial"/>
-              <a:cs typeface="Arial"/>
-            </a:endParaRPr>
           </a:p>
         </p:txBody>
       </p:sp>
@@ -4424,135 +4411,99 @@
                 <a:latin typeface="Arial"/>
                 <a:cs typeface="Arial"/>
               </a:rPr>
-              <a:t>Can pass through </a:t>
-            </a:r>
+              <a:t>Can pass through constrictions</a:t>
+            </a:r>
+          </a:p>
+          <a:p>
+            <a:pPr marL="1028700" indent="-628650">
+              <a:buFont typeface="Arial" pitchFamily="34" charset="0"/>
+              <a:buChar char="•"/>
+            </a:pPr>
             <a:r>
               <a:rPr lang="en-US" sz="4000" dirty="0" smtClean="0">
                 <a:latin typeface="Arial"/>
                 <a:cs typeface="Arial"/>
               </a:rPr>
-              <a:t>constrictions</a:t>
+              <a:t>Can bend around obstacles</a:t>
+            </a:r>
+          </a:p>
+          <a:p>
+            <a:pPr marL="1028700" indent="-628650">
+              <a:buFont typeface="Arial" pitchFamily="34" charset="0"/>
+              <a:buChar char="•"/>
+            </a:pPr>
+            <a:r>
+              <a:rPr lang="en-US" sz="4000" dirty="0" smtClean="0">
+                <a:latin typeface="Arial"/>
+                <a:cs typeface="Arial"/>
+              </a:rPr>
+              <a:t>Can be simple:</a:t>
+            </a:r>
+          </a:p>
+          <a:p>
+            <a:pPr marL="971550" lvl="1" indent="742950">
+              <a:buFont typeface="Wingdings" panose="05000000000000000000" pitchFamily="2" charset="2"/>
+              <a:buChar char="ü"/>
+            </a:pPr>
+            <a:r>
+              <a:rPr lang="en-US" sz="4000" dirty="0" smtClean="0">
+                <a:latin typeface="Arial"/>
+                <a:cs typeface="Arial"/>
+              </a:rPr>
+              <a:t>Easy to design, build, test</a:t>
+            </a:r>
+          </a:p>
+          <a:p>
+            <a:pPr marL="971550" lvl="1" indent="742950">
+              <a:buFont typeface="Wingdings" panose="05000000000000000000" pitchFamily="2" charset="2"/>
+              <a:buChar char="ü"/>
+            </a:pPr>
+            <a:r>
+              <a:rPr lang="en-US" sz="4000" dirty="0" smtClean="0">
+                <a:latin typeface="Arial"/>
+                <a:cs typeface="Arial"/>
+              </a:rPr>
+              <a:t>Disposable/ replaceable</a:t>
+            </a:r>
+          </a:p>
+          <a:p>
+            <a:pPr marL="971550" lvl="1" indent="742950">
+              <a:buFont typeface="Wingdings" panose="05000000000000000000" pitchFamily="2" charset="2"/>
+              <a:buChar char="ü"/>
+            </a:pPr>
+            <a:r>
+              <a:rPr lang="en-US" sz="4000" dirty="0">
+                <a:latin typeface="Arial"/>
+                <a:cs typeface="Arial"/>
+              </a:rPr>
+              <a:t>S</a:t>
+            </a:r>
+            <a:r>
+              <a:rPr lang="en-US" sz="4000" dirty="0" smtClean="0">
+                <a:latin typeface="Arial"/>
+                <a:cs typeface="Arial"/>
+              </a:rPr>
+              <a:t>mall, tiny, </a:t>
+            </a:r>
+            <a:r>
+              <a:rPr lang="en-US" sz="4000" dirty="0" err="1" smtClean="0">
+                <a:latin typeface="Arial"/>
+                <a:cs typeface="Arial"/>
+              </a:rPr>
+              <a:t>nano</a:t>
+            </a:r>
+            <a:r>
+              <a:rPr lang="en-US" sz="4000" dirty="0" smtClean="0">
+                <a:latin typeface="Arial"/>
+                <a:cs typeface="Arial"/>
+              </a:rPr>
+              <a:t>/micro robots</a:t>
             </a:r>
             <a:endParaRPr lang="en-US" sz="4000" dirty="0" smtClean="0">
               <a:latin typeface="Arial"/>
               <a:cs typeface="Arial"/>
             </a:endParaRPr>
           </a:p>
-          <a:p>
-            <a:pPr marL="1028700" indent="-628650">
-              <a:buFont typeface="Arial" pitchFamily="34" charset="0"/>
-              <a:buChar char="•"/>
-            </a:pPr>
-            <a:r>
-              <a:rPr lang="en-US" sz="4000" dirty="0" smtClean="0">
-                <a:latin typeface="Arial"/>
-                <a:cs typeface="Arial"/>
-              </a:rPr>
-              <a:t>Can bend around </a:t>
-            </a:r>
-            <a:r>
-              <a:rPr lang="en-US" sz="4000" dirty="0" smtClean="0">
-                <a:latin typeface="Arial"/>
-                <a:cs typeface="Arial"/>
-              </a:rPr>
-              <a:t>obstacles</a:t>
-            </a:r>
-            <a:endParaRPr lang="en-US" sz="4000" dirty="0" smtClean="0">
-              <a:latin typeface="Arial"/>
-              <a:cs typeface="Arial"/>
-            </a:endParaRPr>
-          </a:p>
-          <a:p>
-            <a:pPr marL="1028700" indent="-628650">
-              <a:buFont typeface="Arial" pitchFamily="34" charset="0"/>
-              <a:buChar char="•"/>
-            </a:pPr>
-            <a:r>
-              <a:rPr lang="en-US" sz="4000" dirty="0" smtClean="0">
-                <a:latin typeface="Arial"/>
-                <a:cs typeface="Arial"/>
-              </a:rPr>
-              <a:t>Can be simple:</a:t>
-            </a:r>
-          </a:p>
-          <a:p>
-            <a:pPr marL="971550" lvl="1" indent="742950">
-              <a:buFont typeface="Wingdings" panose="05000000000000000000" pitchFamily="2" charset="2"/>
-              <a:buChar char="ü"/>
-            </a:pPr>
-            <a:r>
-              <a:rPr lang="en-US" sz="4000" dirty="0" smtClean="0">
-                <a:latin typeface="Arial"/>
-                <a:cs typeface="Arial"/>
-              </a:rPr>
-              <a:t>Easy to design, build, test</a:t>
-            </a:r>
-          </a:p>
-          <a:p>
-            <a:pPr marL="971550" lvl="1" indent="742950">
-              <a:buFont typeface="Wingdings" panose="05000000000000000000" pitchFamily="2" charset="2"/>
-              <a:buChar char="ü"/>
-            </a:pPr>
-            <a:r>
-              <a:rPr lang="en-US" sz="4000" dirty="0" smtClean="0">
-                <a:latin typeface="Arial"/>
-                <a:cs typeface="Arial"/>
-              </a:rPr>
-              <a:t>Disposable/ replaceable</a:t>
-            </a:r>
-          </a:p>
-          <a:p>
-            <a:pPr marL="971550" lvl="1" indent="742950">
-              <a:buFont typeface="Wingdings" panose="05000000000000000000" pitchFamily="2" charset="2"/>
-              <a:buChar char="ü"/>
-            </a:pPr>
-            <a:r>
-              <a:rPr lang="en-US" sz="4000" dirty="0">
-                <a:latin typeface="Arial"/>
-                <a:cs typeface="Arial"/>
-              </a:rPr>
-              <a:t>S</a:t>
-            </a:r>
-            <a:r>
-              <a:rPr lang="en-US" sz="4000" dirty="0" smtClean="0">
-                <a:latin typeface="Arial"/>
-                <a:cs typeface="Arial"/>
-              </a:rPr>
-              <a:t>mall</a:t>
-            </a:r>
-            <a:r>
-              <a:rPr lang="en-US" sz="4000" dirty="0" smtClean="0">
-                <a:latin typeface="Arial"/>
-                <a:cs typeface="Arial"/>
-              </a:rPr>
-              <a:t>, tiny, </a:t>
-            </a:r>
-            <a:r>
-              <a:rPr lang="en-US" sz="4000" dirty="0" err="1" smtClean="0">
-                <a:latin typeface="Arial"/>
-                <a:cs typeface="Arial"/>
-              </a:rPr>
-              <a:t>nano</a:t>
-            </a:r>
-            <a:r>
-              <a:rPr lang="en-US" sz="4000" dirty="0" smtClean="0">
-                <a:latin typeface="Arial"/>
-                <a:cs typeface="Arial"/>
-              </a:rPr>
-              <a:t> </a:t>
-            </a:r>
-            <a:r>
-              <a:rPr lang="en-US" sz="4000" dirty="0" err="1" smtClean="0">
-                <a:latin typeface="Arial"/>
-                <a:cs typeface="Arial"/>
-              </a:rPr>
-              <a:t>robbots</a:t>
-            </a:r>
-            <a:endParaRPr lang="en-US" sz="4000" dirty="0" smtClean="0">
-              <a:latin typeface="Arial"/>
-              <a:cs typeface="Arial"/>
-            </a:endParaRPr>
-          </a:p>
         </p:txBody>
       </p:sp>
       <p:sp>
@@ -4583,21 +4534,35 @@
                 <a:latin typeface="Arial"/>
                 <a:cs typeface="Arial"/>
               </a:rPr>
-              <a:t>(1)</a:t>
+              <a:t>(1) </a:t>
             </a:r>
             <a:r>
               <a:rPr lang="en-US" sz="4000" b="1" dirty="0" smtClean="0">
                 <a:latin typeface="Arial"/>
                 <a:cs typeface="Arial"/>
               </a:rPr>
-              <a:t> </a:t>
+              <a:t>Controlling </a:t>
+            </a:r>
+            <a:r>
+              <a:rPr lang="en-US" sz="4000" b="1" i="1" dirty="0" smtClean="0">
+                <a:latin typeface="Arial"/>
+                <a:cs typeface="Arial"/>
+              </a:rPr>
+              <a:t>mean </a:t>
+            </a:r>
+            <a:r>
+              <a:rPr lang="en-US" sz="4000" b="1" i="1" dirty="0" smtClean="0">
+                <a:latin typeface="Arial"/>
+                <a:cs typeface="Arial"/>
+              </a:rPr>
+              <a:t>position </a:t>
             </a:r>
             <a:r>
               <a:rPr lang="en-US" sz="4000" b="1" dirty="0" smtClean="0">
                 <a:latin typeface="Arial"/>
                 <a:cs typeface="Arial"/>
               </a:rPr>
-              <a:t>Mean position of </a:t>
+              <a:t>of </a:t>
             </a:r>
           </a:p>
           <a:p>
@@ -4614,22 +4579,19 @@
                 <a:latin typeface="Arial"/>
                 <a:cs typeface="Arial"/>
               </a:rPr>
-              <a:t>00 </a:t>
+              <a:t>00 robots with different </a:t>
             </a:r>
             <a:r>
               <a:rPr lang="en-US" sz="4000" b="1" dirty="0" smtClean="0">
                 <a:latin typeface="Arial"/>
                 <a:cs typeface="Arial"/>
               </a:rPr>
-              <a:t>robots </a:t>
-            </a:r>
-            <a:r>
-              <a:rPr lang="en-US" sz="4000" b="1" dirty="0" smtClean="0">
-                <a:latin typeface="Arial"/>
-                <a:cs typeface="Arial"/>
-              </a:rPr>
-              <a:t>with different controllers</a:t>
-            </a:r>
+              <a:t>gain settings</a:t>
+            </a:r>
+            <a:endParaRPr lang="en-US" sz="4000" b="1" dirty="0" smtClean="0">
+              <a:latin typeface="Arial"/>
+              <a:cs typeface="Arial"/>
+            </a:endParaRPr>
           </a:p>
           <a:p>
             <a:pPr algn="ctr"/>
@@ -4648,21 +4610,93 @@
                 <a:latin typeface="Arial"/>
                 <a:cs typeface="Arial"/>
               </a:rPr>
-              <a:t>Proportional </a:t>
+              <a:t>Proportional gains</a:t>
+            </a:r>
+            <a:r>
+              <a:rPr lang="en-US" sz="4000" dirty="0">
+                <a:latin typeface="Arial"/>
+                <a:cs typeface="Arial"/>
+              </a:rPr>
+              <a:t>, </a:t>
+            </a:r>
+            <a:r>
+              <a:rPr lang="en-US" sz="4000" i="1" dirty="0" err="1" smtClean="0">
+                <a:latin typeface="Arial"/>
+                <a:cs typeface="Arial"/>
+              </a:rPr>
+              <a:t>K</a:t>
+            </a:r>
+            <a:r>
+              <a:rPr lang="en-US" sz="4000" i="1" baseline="-25000" dirty="0" err="1" smtClean="0">
+                <a:latin typeface="Arial"/>
+                <a:cs typeface="Arial"/>
+              </a:rPr>
+              <a:t>p</a:t>
+            </a:r>
+            <a:r>
+              <a:rPr lang="en-US" sz="4000" i="1" dirty="0" smtClean="0">
+                <a:latin typeface="Arial"/>
+                <a:cs typeface="Arial"/>
+              </a:rPr>
+              <a:t>, </a:t>
             </a:r>
             <a:r>
               <a:rPr lang="en-US" sz="4000" dirty="0" smtClean="0">
                 <a:latin typeface="Arial"/>
                 <a:cs typeface="Arial"/>
               </a:rPr>
-              <a:t>gains</a:t>
-            </a:r>
+              <a:t>increase the response</a:t>
+            </a:r>
+            <a:r>
+              <a:rPr lang="en-US" sz="4000" dirty="0" smtClean="0">
+                <a:latin typeface="Arial"/>
+                <a:cs typeface="Arial"/>
+              </a:rPr>
+              <a:t>,</a:t>
+            </a:r>
+          </a:p>
+          <a:p>
+            <a:pPr marL="190500"/>
             <a:r>
               <a:rPr lang="en-US" sz="4000" dirty="0">
                 <a:latin typeface="Arial"/>
                 <a:cs typeface="Arial"/>
               </a:rPr>
-              <a:t>, </a:t>
+              <a:t> </a:t>
+            </a:r>
+            <a:r>
+              <a:rPr lang="en-US" sz="4000" dirty="0" smtClean="0">
+                <a:latin typeface="Arial"/>
+                <a:cs typeface="Arial"/>
+              </a:rPr>
+              <a:t> </a:t>
+            </a:r>
+            <a:r>
+              <a:rPr lang="en-US" sz="4000" dirty="0" smtClean="0">
+                <a:latin typeface="Arial"/>
+                <a:cs typeface="Arial"/>
+              </a:rPr>
+              <a:t> </a:t>
+            </a:r>
+            <a:r>
+              <a:rPr lang="en-US" sz="4000" dirty="0" smtClean="0">
+                <a:latin typeface="Arial"/>
+                <a:cs typeface="Arial"/>
+              </a:rPr>
+              <a:t>but also increase overshoot</a:t>
+            </a:r>
+          </a:p>
+          <a:p>
+            <a:pPr marL="571500" indent="-381000">
+              <a:buFont typeface="Arial"/>
+              <a:buChar char="•"/>
+            </a:pPr>
+            <a:r>
+              <a:rPr lang="en-US" sz="4000" dirty="0" smtClean="0">
+                <a:latin typeface="Arial"/>
+                <a:cs typeface="Arial"/>
+              </a:rPr>
+              <a:t>Derivative gains, </a:t>
             </a:r>
             <a:r>
               <a:rPr lang="en-US" sz="4000" i="1" dirty="0" err="1" smtClean="0">
@@ -4676,28 +4710,28 @@
                 <a:latin typeface="Arial"/>
                 <a:cs typeface="Arial"/>
               </a:rPr>
-              <a:t>p</a:t>
+              <a:t>d</a:t>
+            </a:r>
+            <a:r>
+              <a:rPr lang="en-US" sz="4000" i="1" dirty="0">
+                <a:latin typeface="Arial"/>
+                <a:cs typeface="Arial"/>
+              </a:rPr>
+              <a:t>,</a:t>
             </a:r>
             <a:r>
               <a:rPr lang="en-US" sz="4000" i="1" dirty="0" smtClean="0">
                 <a:latin typeface="Arial"/>
                 <a:cs typeface="Arial"/>
               </a:rPr>
-              <a:t>, </a:t>
+              <a:t> </a:t>
             </a:r>
             <a:r>
               <a:rPr lang="en-US" sz="4000" dirty="0" smtClean="0">
                 <a:latin typeface="Arial"/>
                 <a:cs typeface="Arial"/>
               </a:rPr>
-              <a:t>increase the response, but also increase </a:t>
-            </a:r>
-            <a:r>
-              <a:rPr lang="en-US" sz="4000" dirty="0" smtClean="0">
-                <a:latin typeface="Arial"/>
-                <a:cs typeface="Arial"/>
-              </a:rPr>
-              <a:t>overshoot</a:t>
+              <a:t>reduce overshoot, </a:t>
             </a:r>
             <a:endParaRPr lang="en-US" sz="4000" dirty="0" smtClean="0">
               <a:latin typeface="Arial"/>
@@ -4705,109 +4739,35 @@
             </a:endParaRPr>
           </a:p>
           <a:p>
-            <a:pPr marL="571500" indent="-381000">
-              <a:buFont typeface="Arial"/>
-              <a:buChar char="•"/>
-            </a:pPr>
+            <a:pPr marL="190500"/>
+            <a:r>
+              <a:rPr lang="en-US" sz="4000" dirty="0">
+                <a:latin typeface="Arial"/>
+                <a:cs typeface="Arial"/>
+              </a:rPr>
+              <a:t> </a:t>
+            </a:r>
             <a:r>
               <a:rPr lang="en-US" sz="4000" dirty="0" smtClean="0">
                 <a:latin typeface="Arial"/>
                 <a:cs typeface="Arial"/>
               </a:rPr>
-              <a:t>Derivative gains, </a:t>
-            </a:r>
-            <a:r>
-              <a:rPr lang="en-US" sz="4000" i="1" dirty="0" err="1" smtClean="0">
-                <a:latin typeface="Arial"/>
-                <a:cs typeface="Arial"/>
-              </a:rPr>
-              <a:t>K</a:t>
-            </a:r>
-            <a:r>
-              <a:rPr lang="en-US" sz="4000" i="1" baseline="-25000" dirty="0" err="1" smtClean="0">
-                <a:latin typeface="Arial"/>
-                <a:cs typeface="Arial"/>
-              </a:rPr>
-              <a:t>d</a:t>
-            </a:r>
-            <a:r>
-              <a:rPr lang="en-US" sz="4000" i="1" dirty="0">
-                <a:latin typeface="Arial"/>
-                <a:cs typeface="Arial"/>
-              </a:rPr>
-              <a:t>,</a:t>
-            </a:r>
-            <a:r>
-              <a:rPr lang="en-US" sz="4000" i="1" dirty="0" smtClean="0">
-                <a:latin typeface="Arial"/>
-                <a:cs typeface="Arial"/>
-              </a:rPr>
-              <a:t> </a:t>
+              <a:t>  </a:t>
             </a:r>
             <a:r>
               <a:rPr lang="en-US" sz="4000" dirty="0" smtClean="0">
                 <a:latin typeface="Arial"/>
                 <a:cs typeface="Arial"/>
               </a:rPr>
-              <a:t>reduce overshoot, but slow the response</a:t>
-            </a:r>
-          </a:p>
-        </p:txBody>
-      </p:sp>
-      <p:sp>
-        <p:nvSpPr>
-          <p:cNvPr id="373" name="TextBox 372"/>
-          <p:cNvSpPr txBox="1"/>
-          <p:nvPr/>
-        </p:nvSpPr>
-        <p:spPr>
-          <a:xfrm>
-            <a:off x="15328551" y="19609355"/>
-            <a:ext cx="13033231" cy="3170099"/>
-          </a:xfrm>
-          <a:prstGeom prst="rect">
-            <a:avLst/>
-          </a:prstGeom>
-          <a:noFill/>
-        </p:spPr>
-        <p:txBody>
-          <a:bodyPr wrap="square" rtlCol="0">
-            <a:spAutoFit/>
-          </a:bodyPr>
-          <a:lstStyle/>
-          <a:p>
-            <a:pPr algn="ctr"/>
-            <a:r>
-              <a:rPr lang="en-US" sz="4000" b="1" dirty="0" smtClean="0">
-                <a:latin typeface="Arial"/>
-                <a:cs typeface="Arial"/>
-              </a:rPr>
-              <a:t>(2) Controlling variance with applying Brownian noise</a:t>
-            </a:r>
-          </a:p>
-          <a:p>
-            <a:pPr algn="ctr"/>
-            <a:endParaRPr lang="en-US" sz="4000" b="1" dirty="0" smtClean="0">
-              <a:latin typeface="Arial"/>
-              <a:cs typeface="Arial"/>
-            </a:endParaRPr>
-          </a:p>
-          <a:p>
-            <a:pPr marL="571500" indent="-571500">
-              <a:buFont typeface="Arial"/>
-              <a:buChar char="•"/>
-            </a:pPr>
+              <a:t>but </a:t>
+            </a:r>
             <a:r>
               <a:rPr lang="en-US" sz="4000" dirty="0" smtClean="0">
                 <a:latin typeface="Arial"/>
                 <a:cs typeface="Arial"/>
               </a:rPr>
-              <a:t>Robots wait for increasing variance and go to the corners for decreasing variance</a:t>
-            </a:r>
-            <a:endParaRPr lang="en-US" sz="4000" dirty="0" smtClean="0">
-              <a:latin typeface="Arial"/>
-              <a:cs typeface="Arial"/>
-            </a:endParaRPr>
+              <a:t>slow the response</a:t>
+            </a:r>
           </a:p>
         </p:txBody>
       </p:sp>
@@ -4867,10 +4827,6 @@
               </a:rPr>
               <a:t>Results</a:t>
             </a:r>
-            <a:endParaRPr lang="en-US" sz="7000" dirty="0" smtClean="0">
-              <a:latin typeface="Arial"/>
-              <a:cs typeface="Arial"/>
-            </a:endParaRPr>
           </a:p>
         </p:txBody>
       </p:sp>
@@ -5055,36 +5011,6 @@
       </p:sp>
       <p:pic>
         <p:nvPicPr>
-          <p:cNvPr id="376" name="Picture 375"/>
-          <p:cNvPicPr>
-            <a:picLocks noChangeAspect="1"/>
-          </p:cNvPicPr>
-          <p:nvPr/>
-        </p:nvPicPr>
-        <p:blipFill>
-          <a:blip r:embed="rId5">
-            <a:extLst>
-              <a:ext uri="{28A0092B-C50C-407E-A947-70E740481C1C}">
-                <a14:useLocalDpi xmlns:a14="http://schemas.microsoft.com/office/drawing/2010/main" val="0"/>
-              </a:ext>
-            </a:extLst>
-          </a:blip>
-          <a:stretch>
-            <a:fillRect/>
-          </a:stretch>
-        </p:blipFill>
-        <p:spPr>
-          <a:xfrm>
-            <a:off x="34361752" y="2448988"/>
-            <a:ext cx="1640003" cy="1615305"/>
-          </a:xfrm>
-          <a:prstGeom prst="rect">
-            <a:avLst/>
-          </a:prstGeom>
-        </p:spPr>
-      </p:pic>
-      <p:pic>
-        <p:nvPicPr>
           <p:cNvPr id="377" name="Picture 376"/>
           <p:cNvPicPr>
             <a:picLocks noChangeAspect="1"/>
@@ -5106,7 +5032,7 @@
         <p:spPr>
           <a:xfrm>
             <a:off x="36430149" y="2448929"/>
-            <a:ext cx="1430301" cy="1335596"/>
+            <a:ext cx="1430301" cy="1437272"/>
           </a:xfrm>
           <a:prstGeom prst="rect">
             <a:avLst/>
@@ -5308,13 +5234,13 @@
               </a:ext>
             </a:extLst>
           </a:blip>
-          <a:srcRect b="16880"/>
+          <a:srcRect b="23098"/>
           <a:stretch/>
         </p:blipFill>
         <p:spPr>
           <a:xfrm>
             <a:off x="40412353" y="2405294"/>
-            <a:ext cx="1404263" cy="1346295"/>
+            <a:ext cx="1404263" cy="1480907"/>
           </a:xfrm>
           <a:prstGeom prst="rect">
             <a:avLst/>
@@ -5453,8 +5379,19 @@
                 <a:latin typeface="Arial"/>
                 <a:cs typeface="Arial"/>
               </a:rPr>
-              <a:t>o to corners if variance is bigger than max.</a:t>
-            </a:r>
+              <a:t>o to corners if variance is bigger than </a:t>
+            </a:r>
+            <a:r>
+              <a:rPr lang="en-US" sz="4000" dirty="0" smtClean="0">
+                <a:latin typeface="Arial"/>
+                <a:cs typeface="Arial"/>
+              </a:rPr>
+              <a:t>max</a:t>
+            </a:r>
+            <a:endParaRPr lang="en-US" sz="4000" dirty="0" smtClean="0">
+              <a:latin typeface="Arial"/>
+              <a:cs typeface="Arial"/>
+            </a:endParaRPr>
           </a:p>
           <a:p>
             <a:pPr marL="571500" indent="-571500">
@@ -5818,8 +5755,8 @@
         </p:nvSpPr>
         <p:spPr>
           <a:xfrm>
-            <a:off x="9696202" y="8119671"/>
-            <a:ext cx="3471333" cy="707886"/>
+            <a:off x="9271000" y="8119671"/>
+            <a:ext cx="3896535" cy="400110"/>
           </a:xfrm>
           <a:prstGeom prst="rect">
             <a:avLst/>
@@ -5837,7 +5774,14 @@
                 <a:latin typeface="Arial"/>
                 <a:cs typeface="Arial"/>
               </a:rPr>
-              <a:t>Swarm Piano mover’s </a:t>
+              <a:t>Swarm Piano </a:t>
+            </a:r>
+            <a:r>
+              <a:rPr lang="en-US" sz="2000" b="1" i="1" dirty="0" smtClean="0">
+                <a:latin typeface="Arial"/>
+                <a:cs typeface="Arial"/>
+              </a:rPr>
+              <a:t>Mover’s </a:t>
             </a:r>
             <a:r>
               <a:rPr lang="en-US" sz="2000" b="1" i="1" dirty="0" smtClean="0">
@@ -6147,14 +6091,7 @@
                 <a:latin typeface="Arial"/>
                 <a:cs typeface="Arial"/>
               </a:rPr>
-              <a:t>Mean </a:t>
-            </a:r>
-            <a:r>
-              <a:rPr lang="en-US" sz="1700" dirty="0" smtClean="0">
-                <a:latin typeface="Arial"/>
-                <a:cs typeface="Arial"/>
-              </a:rPr>
-              <a:t>Position</a:t>
+              <a:t>Mean Position</a:t>
             </a:r>
           </a:p>
           <a:p>
@@ -6484,12 +6421,79 @@
               <a:buChar char="•"/>
             </a:pPr>
             <a:r>
+              <a:rPr lang="en-US" sz="4000" b="1" dirty="0">
+                <a:latin typeface="Arial"/>
+                <a:cs typeface="Arial"/>
+              </a:rPr>
+              <a:t>P</a:t>
+            </a:r>
+            <a:r>
+              <a:rPr lang="en-US" sz="4000" b="1" dirty="0" smtClean="0">
+                <a:latin typeface="Arial"/>
+                <a:cs typeface="Arial"/>
+              </a:rPr>
+              <a:t>roblem</a:t>
+            </a:r>
+            <a:r>
               <a:rPr lang="en-US" sz="4000" dirty="0" smtClean="0">
                 <a:latin typeface="Arial"/>
                 <a:cs typeface="Arial"/>
               </a:rPr>
-              <a:t>The problem is pushing a block with swarm of robots to reach a goal through a maze</a:t>
-            </a:r>
+              <a:t>: push </a:t>
+            </a:r>
+            <a:r>
+              <a:rPr lang="en-US" sz="4000" dirty="0" smtClean="0">
+                <a:latin typeface="Arial"/>
+                <a:cs typeface="Arial"/>
+              </a:rPr>
+              <a:t>a block </a:t>
+            </a:r>
+            <a:r>
+              <a:rPr lang="en-US" sz="4000" dirty="0">
+                <a:latin typeface="Arial"/>
+                <a:cs typeface="Arial"/>
+              </a:rPr>
+              <a:t>through a </a:t>
+            </a:r>
+            <a:r>
+              <a:rPr lang="en-US" sz="4000" dirty="0" smtClean="0">
+                <a:latin typeface="Arial"/>
+                <a:cs typeface="Arial"/>
+              </a:rPr>
+              <a:t>maze using a </a:t>
+            </a:r>
+            <a:r>
+              <a:rPr lang="en-US" sz="4000" dirty="0" smtClean="0">
+                <a:latin typeface="Arial"/>
+                <a:cs typeface="Arial"/>
+              </a:rPr>
+              <a:t>swarm </a:t>
+            </a:r>
+            <a:r>
+              <a:rPr lang="en-US" sz="4000" dirty="0" smtClean="0">
+                <a:latin typeface="Arial"/>
+                <a:cs typeface="Arial"/>
+              </a:rPr>
+              <a:t>of robots </a:t>
+            </a:r>
+            <a:r>
+              <a:rPr lang="en-US" sz="4000" dirty="0" smtClean="0">
+                <a:latin typeface="Arial"/>
+                <a:cs typeface="Arial"/>
+              </a:rPr>
+              <a:t>with </a:t>
+            </a:r>
+            <a:r>
+              <a:rPr lang="en-US" sz="4000" i="1" dirty="0" smtClean="0">
+                <a:latin typeface="Arial"/>
+                <a:cs typeface="Arial"/>
+              </a:rPr>
+              <a:t>global inputs</a:t>
+            </a:r>
+            <a:endParaRPr lang="en-US" sz="4000" i="1" dirty="0" smtClean="0">
+              <a:latin typeface="Arial"/>
+              <a:cs typeface="Arial"/>
+            </a:endParaRPr>
           </a:p>
           <a:p>
             <a:endParaRPr lang="en-US" sz="4000" dirty="0" smtClean="0">
@@ -6507,7 +6511,21 @@
                 <a:latin typeface="Arial"/>
                 <a:cs typeface="Arial"/>
               </a:rPr>
-              <a:t>All the robots get the same global input and use hybrid hysteresis mean-variance control to reach the goal</a:t>
+              <a:t>All </a:t>
+            </a:r>
+            <a:r>
+              <a:rPr lang="en-US" sz="4000" dirty="0" smtClean="0">
+                <a:latin typeface="Arial"/>
+                <a:cs typeface="Arial"/>
+              </a:rPr>
+              <a:t>robots </a:t>
+            </a:r>
+            <a:r>
+              <a:rPr lang="en-US" sz="4000" dirty="0" smtClean="0">
+                <a:latin typeface="Arial"/>
+                <a:cs typeface="Arial"/>
+              </a:rPr>
+              <a:t>get the same global input and use hybrid hysteresis mean-variance control to reach the goal</a:t>
             </a:r>
           </a:p>
           <a:p>
@@ -6530,7 +6548,56 @@
                 <a:latin typeface="Arial"/>
                 <a:cs typeface="Arial"/>
               </a:rPr>
-              <a:t>We choose local goals for the swarm to go, which is behind the block in order to push it forward</a:t>
+              <a:t>We choose </a:t>
+            </a:r>
+            <a:r>
+              <a:rPr lang="en-US" sz="4000" i="1" dirty="0" smtClean="0">
+                <a:latin typeface="Arial"/>
+                <a:cs typeface="Arial"/>
+              </a:rPr>
+              <a:t>local goals </a:t>
+            </a:r>
+            <a:r>
+              <a:rPr lang="en-US" sz="4000" dirty="0" smtClean="0">
+                <a:latin typeface="Arial"/>
+                <a:cs typeface="Arial"/>
+              </a:rPr>
+              <a:t>to steer the swarm: aggregate behind </a:t>
+            </a:r>
+            <a:r>
+              <a:rPr lang="en-US" sz="4000" dirty="0" smtClean="0">
+                <a:latin typeface="Arial"/>
+                <a:cs typeface="Arial"/>
+              </a:rPr>
+              <a:t>the block </a:t>
+            </a:r>
+            <a:r>
+              <a:rPr lang="en-US" sz="4000" dirty="0" smtClean="0">
+                <a:latin typeface="Arial"/>
+                <a:cs typeface="Arial"/>
+              </a:rPr>
+              <a:t>to </a:t>
+            </a:r>
+            <a:r>
+              <a:rPr lang="en-US" sz="4000" dirty="0" smtClean="0">
+                <a:latin typeface="Arial"/>
+                <a:cs typeface="Arial"/>
+              </a:rPr>
+              <a:t>push </a:t>
+            </a:r>
+            <a:r>
+              <a:rPr lang="en-US" sz="4000" dirty="0" smtClean="0">
+                <a:latin typeface="Arial"/>
+                <a:cs typeface="Arial"/>
+              </a:rPr>
+              <a:t>the block </a:t>
+            </a:r>
+            <a:r>
+              <a:rPr lang="en-US" sz="4000" dirty="0" smtClean="0">
+                <a:latin typeface="Arial"/>
+                <a:cs typeface="Arial"/>
+              </a:rPr>
+              <a:t>forward</a:t>
             </a:r>
           </a:p>
           <a:p>
@@ -6572,7 +6639,21 @@
                 <a:latin typeface="Arial"/>
                 <a:cs typeface="Arial"/>
               </a:rPr>
-              <a:t>Bread-first search to find the shortest path from starting point     to the    goal </a:t>
+              <a:t>Bread-first search </a:t>
+            </a:r>
+            <a:r>
+              <a:rPr lang="en-US" sz="4000" dirty="0" smtClean="0">
+                <a:latin typeface="Arial"/>
+                <a:cs typeface="Arial"/>
+              </a:rPr>
+              <a:t>(BFS) to </a:t>
+            </a:r>
+            <a:r>
+              <a:rPr lang="en-US" sz="4000" dirty="0" smtClean="0">
+                <a:latin typeface="Arial"/>
+                <a:cs typeface="Arial"/>
+              </a:rPr>
+              <a:t>find the shortest path from starting point     to the    goal </a:t>
             </a:r>
             <a:endParaRPr lang="en-US" sz="4000" dirty="0">
               <a:latin typeface="Arial"/>
@@ -6825,7 +6906,7 @@
         </p:blipFill>
         <p:spPr>
           <a:xfrm>
-            <a:off x="40310140" y="27418108"/>
+            <a:off x="40259340" y="27418108"/>
             <a:ext cx="513414" cy="522116"/>
           </a:xfrm>
           <a:prstGeom prst="rect">
@@ -6860,7 +6941,21 @@
                 <a:latin typeface="Arial"/>
                 <a:cs typeface="Arial"/>
               </a:rPr>
-              <a:t>In this experiment, 200 robots push the black block in the maze to the goal, by controlling mean and variance</a:t>
+              <a:t>In this experiment, 200 robots push the black block in the maze to the goal, by controlling </a:t>
+            </a:r>
+            <a:r>
+              <a:rPr lang="en-US" sz="4000" dirty="0" smtClean="0">
+                <a:latin typeface="Arial"/>
+                <a:cs typeface="Arial"/>
+              </a:rPr>
+              <a:t>the swarm mean </a:t>
+            </a:r>
+            <a:r>
+              <a:rPr lang="en-US" sz="4000" dirty="0" smtClean="0">
+                <a:latin typeface="Arial"/>
+                <a:cs typeface="Arial"/>
+              </a:rPr>
+              <a:t>and variance</a:t>
             </a:r>
             <a:endParaRPr lang="en-US" sz="4000" dirty="0">
               <a:latin typeface="Arial"/>
@@ -7211,6 +7306,361 @@
               <a:latin typeface="Arial"/>
               <a:cs typeface="Arial"/>
             </a:endParaRPr>
+          </a:p>
+        </p:txBody>
+      </p:sp>
+      <p:sp>
+        <p:nvSpPr>
+          <p:cNvPr id="373" name="TextBox 372"/>
+          <p:cNvSpPr txBox="1"/>
+          <p:nvPr/>
+        </p:nvSpPr>
+        <p:spPr>
+          <a:xfrm>
+            <a:off x="15621631" y="19609355"/>
+            <a:ext cx="12740152" cy="2554545"/>
+          </a:xfrm>
+          <a:prstGeom prst="rect">
+            <a:avLst/>
+          </a:prstGeom>
+          <a:noFill/>
+        </p:spPr>
+        <p:txBody>
+          <a:bodyPr wrap="square" rtlCol="0">
+            <a:spAutoFit/>
+          </a:bodyPr>
+          <a:lstStyle/>
+          <a:p>
+            <a:pPr algn="ctr"/>
+            <a:r>
+              <a:rPr lang="en-US" sz="4000" b="1" dirty="0" smtClean="0">
+                <a:latin typeface="Arial"/>
+                <a:cs typeface="Arial"/>
+              </a:rPr>
+              <a:t>(2) Controlling </a:t>
+            </a:r>
+            <a:r>
+              <a:rPr lang="en-US" sz="4000" b="1" i="1" dirty="0" smtClean="0">
+                <a:latin typeface="Arial"/>
+                <a:cs typeface="Arial"/>
+              </a:rPr>
+              <a:t>variance</a:t>
+            </a:r>
+            <a:r>
+              <a:rPr lang="en-US" sz="4000" b="1" dirty="0" smtClean="0">
+                <a:latin typeface="Arial"/>
+                <a:cs typeface="Arial"/>
+              </a:rPr>
+              <a:t> </a:t>
+            </a:r>
+            <a:r>
+              <a:rPr lang="en-US" sz="4000" b="1" dirty="0" smtClean="0">
+                <a:latin typeface="Arial"/>
+                <a:cs typeface="Arial"/>
+              </a:rPr>
+              <a:t>by </a:t>
+            </a:r>
+          </a:p>
+          <a:p>
+            <a:pPr algn="ctr"/>
+            <a:r>
+              <a:rPr lang="en-US" sz="4000" b="1" dirty="0" smtClean="0">
+                <a:latin typeface="Arial"/>
+                <a:cs typeface="Arial"/>
+              </a:rPr>
+              <a:t>exploiting Brownian noise</a:t>
+            </a:r>
+            <a:endParaRPr lang="en-US" sz="4000" b="1" dirty="0" smtClean="0">
+              <a:latin typeface="Arial"/>
+              <a:cs typeface="Arial"/>
+            </a:endParaRPr>
+          </a:p>
+          <a:p>
+            <a:r>
+              <a:rPr lang="en-US" sz="4000" dirty="0" smtClean="0">
+                <a:latin typeface="Arial"/>
+                <a:cs typeface="Arial"/>
+              </a:rPr>
+              <a:t>Robots </a:t>
+            </a:r>
+            <a:r>
+              <a:rPr lang="en-US" sz="4000" i="1" dirty="0" smtClean="0">
+                <a:latin typeface="Arial"/>
+                <a:cs typeface="Arial"/>
+              </a:rPr>
+              <a:t>wait</a:t>
+            </a:r>
+            <a:r>
+              <a:rPr lang="en-US" sz="4000" dirty="0" smtClean="0">
+                <a:latin typeface="Arial"/>
+                <a:cs typeface="Arial"/>
+              </a:rPr>
+              <a:t> </a:t>
+            </a:r>
+            <a:r>
+              <a:rPr lang="en-US" sz="4000" dirty="0" smtClean="0">
+                <a:latin typeface="Arial"/>
+                <a:cs typeface="Arial"/>
+              </a:rPr>
+              <a:t>to increase variance</a:t>
+            </a:r>
+          </a:p>
+          <a:p>
+            <a:r>
+              <a:rPr lang="en-US" sz="4000" dirty="0" smtClean="0">
+                <a:latin typeface="Arial"/>
+                <a:cs typeface="Arial"/>
+              </a:rPr>
+              <a:t>and </a:t>
+            </a:r>
+            <a:r>
+              <a:rPr lang="en-US" sz="4000" i="1" dirty="0" smtClean="0">
+                <a:latin typeface="Arial"/>
+                <a:cs typeface="Arial"/>
+              </a:rPr>
+              <a:t>go to </a:t>
+            </a:r>
+            <a:r>
+              <a:rPr lang="en-US" sz="4000" i="1" dirty="0" smtClean="0">
+                <a:latin typeface="Arial"/>
+                <a:cs typeface="Arial"/>
+              </a:rPr>
+              <a:t>corners </a:t>
+            </a:r>
+            <a:r>
+              <a:rPr lang="en-US" sz="4000" dirty="0" smtClean="0">
+                <a:latin typeface="Arial"/>
+                <a:cs typeface="Arial"/>
+              </a:rPr>
+              <a:t>to decrease </a:t>
+            </a:r>
+            <a:r>
+              <a:rPr lang="en-US" sz="4000" dirty="0" smtClean="0">
+                <a:latin typeface="Arial"/>
+                <a:cs typeface="Arial"/>
+              </a:rPr>
+              <a:t>variance</a:t>
+            </a:r>
+          </a:p>
+        </p:txBody>
+      </p:sp>
+      <p:pic>
+        <p:nvPicPr>
+          <p:cNvPr id="62" name="Picture 5" descr="C:\Users\atbecker\Downloads\qrcode.26864831.png"/>
+          <p:cNvPicPr>
+            <a:picLocks noChangeAspect="1" noChangeArrowheads="1"/>
+          </p:cNvPicPr>
+          <p:nvPr/>
+        </p:nvPicPr>
+        <p:blipFill>
+          <a:blip r:embed="rId3">
+            <a:extLst>
+              <a:ext uri="{28A0092B-C50C-407E-A947-70E740481C1C}">
+                <a14:useLocalDpi xmlns:a14="http://schemas.microsoft.com/office/drawing/2010/main" val="0"/>
+              </a:ext>
+            </a:extLst>
+          </a:blip>
+          <a:srcRect/>
+          <a:stretch>
+            <a:fillRect/>
+          </a:stretch>
+        </p:blipFill>
+        <p:spPr bwMode="auto">
+          <a:xfrm>
+            <a:off x="39019060" y="16191760"/>
+            <a:ext cx="1620877" cy="1618488"/>
+          </a:xfrm>
+          <a:prstGeom prst="rect">
+            <a:avLst/>
+          </a:prstGeom>
+          <a:noFill/>
+          <a:extLst>
+            <a:ext uri="{909E8E84-426E-40dd-AFC4-6F175D3DCCD1}">
+              <a14:hiddenFill xmlns:a14="http://schemas.microsoft.com/office/drawing/2010/main">
+                <a:solidFill>
+                  <a:srgbClr val="FFFFFF"/>
+                </a:solidFill>
+              </a14:hiddenFill>
+            </a:ext>
+          </a:extLst>
+        </p:spPr>
+      </p:pic>
+      <p:sp>
+        <p:nvSpPr>
+          <p:cNvPr id="63" name="Text Box 22"/>
+          <p:cNvSpPr txBox="1">
+            <a:spLocks noChangeArrowheads="1"/>
+          </p:cNvSpPr>
+          <p:nvPr/>
+        </p:nvSpPr>
+        <p:spPr bwMode="auto">
+          <a:xfrm>
+            <a:off x="40323371" y="16651669"/>
+            <a:ext cx="2616864" cy="979051"/>
+          </a:xfrm>
+          <a:prstGeom prst="rect">
+            <a:avLst/>
+          </a:prstGeom>
+          <a:noFill/>
+          <a:ln>
+            <a:noFill/>
+          </a:ln>
+          <a:extLst>
+            <a:ext uri="{909E8E84-426E-40dd-AFC4-6F175D3DCCD1}">
+              <a14:hiddenFill xmlns:a14="http://schemas.microsoft.com/office/drawing/2010/main">
+                <a:solidFill>
+                  <a:srgbClr val="FFFFFF"/>
+                </a:solidFill>
+              </a14:hiddenFill>
+            </a:ext>
+            <a:ext uri="{91240B29-F687-4f45-9708-019B960494DF}">
+              <a14:hiddenLine xmlns:a14="http://schemas.microsoft.com/office/drawing/2010/main" w="9525">
+                <a:solidFill>
+                  <a:srgbClr val="000000"/>
+                </a:solidFill>
+                <a:miter lim="800000"/>
+                <a:headEnd/>
+                <a:tailEnd/>
+              </a14:hiddenLine>
+            </a:ext>
+          </a:extLst>
+        </p:spPr>
+        <p:txBody>
+          <a:bodyPr wrap="square" lIns="179991" tIns="179991" rIns="179991" bIns="179991">
+            <a:spAutoFit/>
+          </a:bodyPr>
+          <a:lstStyle>
+            <a:defPPr>
+              <a:defRPr lang="en-US"/>
+            </a:defPPr>
+            <a:lvl1pPr algn="l" defTabSz="2087563" rtl="0" fontAlgn="base">
+              <a:spcBef>
+                <a:spcPct val="0"/>
+              </a:spcBef>
+              <a:spcAft>
+                <a:spcPct val="0"/>
+              </a:spcAft>
+              <a:defRPr sz="8100" kern="1200">
+                <a:solidFill>
+                  <a:schemeClr val="tx1"/>
+                </a:solidFill>
+                <a:latin typeface="Arial" panose="020B0604020202020204" pitchFamily="34" charset="0"/>
+                <a:ea typeface="MS PGothic" panose="020B0600070205080204" pitchFamily="34" charset="-128"/>
+                <a:cs typeface="+mn-cs"/>
+              </a:defRPr>
+            </a:lvl1pPr>
+            <a:lvl2pPr marL="2087563" indent="-1652588" algn="l" defTabSz="2087563" rtl="0" fontAlgn="base">
+              <a:spcBef>
+                <a:spcPct val="0"/>
+              </a:spcBef>
+              <a:spcAft>
+                <a:spcPct val="0"/>
+              </a:spcAft>
+              <a:defRPr sz="8100" kern="1200">
+                <a:solidFill>
+                  <a:schemeClr val="tx1"/>
+                </a:solidFill>
+                <a:latin typeface="Arial" panose="020B0604020202020204" pitchFamily="34" charset="0"/>
+                <a:ea typeface="MS PGothic" panose="020B0600070205080204" pitchFamily="34" charset="-128"/>
+                <a:cs typeface="+mn-cs"/>
+              </a:defRPr>
+            </a:lvl2pPr>
+            <a:lvl3pPr marL="4176713" indent="-3305175" algn="l" defTabSz="2087563" rtl="0" fontAlgn="base">
+              <a:spcBef>
+                <a:spcPct val="0"/>
+              </a:spcBef>
+              <a:spcAft>
+                <a:spcPct val="0"/>
+              </a:spcAft>
+              <a:defRPr sz="8100" kern="1200">
+                <a:solidFill>
+                  <a:schemeClr val="tx1"/>
+                </a:solidFill>
+                <a:latin typeface="Arial" panose="020B0604020202020204" pitchFamily="34" charset="0"/>
+                <a:ea typeface="MS PGothic" panose="020B0600070205080204" pitchFamily="34" charset="-128"/>
+                <a:cs typeface="+mn-cs"/>
+              </a:defRPr>
+            </a:lvl3pPr>
+            <a:lvl4pPr marL="6264275" indent="-4960938" algn="l" defTabSz="2087563" rtl="0" fontAlgn="base">
+              <a:spcBef>
+                <a:spcPct val="0"/>
+              </a:spcBef>
+              <a:spcAft>
+                <a:spcPct val="0"/>
+              </a:spcAft>
+              <a:defRPr sz="8100" kern="1200">
+                <a:solidFill>
+                  <a:schemeClr val="tx1"/>
+                </a:solidFill>
+                <a:latin typeface="Arial" panose="020B0604020202020204" pitchFamily="34" charset="0"/>
+                <a:ea typeface="MS PGothic" panose="020B0600070205080204" pitchFamily="34" charset="-128"/>
+                <a:cs typeface="+mn-cs"/>
+              </a:defRPr>
+            </a:lvl4pPr>
+            <a:lvl5pPr marL="8353425" indent="-6613525" algn="l" defTabSz="2087563" rtl="0" fontAlgn="base">
+              <a:spcBef>
+                <a:spcPct val="0"/>
+              </a:spcBef>
+              <a:spcAft>
+                <a:spcPct val="0"/>
+              </a:spcAft>
+              <a:defRPr sz="8100" kern="1200">
+                <a:solidFill>
+                  <a:schemeClr val="tx1"/>
+                </a:solidFill>
+                <a:latin typeface="Arial" panose="020B0604020202020204" pitchFamily="34" charset="0"/>
+                <a:ea typeface="MS PGothic" panose="020B0600070205080204" pitchFamily="34" charset="-128"/>
+                <a:cs typeface="+mn-cs"/>
+              </a:defRPr>
+            </a:lvl5pPr>
+            <a:lvl6pPr marL="2286000" algn="l" defTabSz="914400" rtl="0" eaLnBrk="1" latinLnBrk="0" hangingPunct="1">
+              <a:defRPr sz="8100" kern="1200">
+                <a:solidFill>
+                  <a:schemeClr val="tx1"/>
+                </a:solidFill>
+                <a:latin typeface="Arial" panose="020B0604020202020204" pitchFamily="34" charset="0"/>
+                <a:ea typeface="MS PGothic" panose="020B0600070205080204" pitchFamily="34" charset="-128"/>
+                <a:cs typeface="+mn-cs"/>
+              </a:defRPr>
+            </a:lvl6pPr>
+            <a:lvl7pPr marL="2743200" algn="l" defTabSz="914400" rtl="0" eaLnBrk="1" latinLnBrk="0" hangingPunct="1">
+              <a:defRPr sz="8100" kern="1200">
+                <a:solidFill>
+                  <a:schemeClr val="tx1"/>
+                </a:solidFill>
+                <a:latin typeface="Arial" panose="020B0604020202020204" pitchFamily="34" charset="0"/>
+                <a:ea typeface="MS PGothic" panose="020B0600070205080204" pitchFamily="34" charset="-128"/>
+                <a:cs typeface="+mn-cs"/>
+              </a:defRPr>
+            </a:lvl7pPr>
+            <a:lvl8pPr marL="3200400" algn="l" defTabSz="914400" rtl="0" eaLnBrk="1" latinLnBrk="0" hangingPunct="1">
+              <a:defRPr sz="8100" kern="1200">
+                <a:solidFill>
+                  <a:schemeClr val="tx1"/>
+                </a:solidFill>
+                <a:latin typeface="Arial" panose="020B0604020202020204" pitchFamily="34" charset="0"/>
+                <a:ea typeface="MS PGothic" panose="020B0600070205080204" pitchFamily="34" charset="-128"/>
+                <a:cs typeface="+mn-cs"/>
+              </a:defRPr>
+            </a:lvl8pPr>
+            <a:lvl9pPr marL="3657600" algn="l" defTabSz="914400" rtl="0" eaLnBrk="1" latinLnBrk="0" hangingPunct="1">
+              <a:defRPr sz="8100" kern="1200">
+                <a:solidFill>
+                  <a:schemeClr val="tx1"/>
+                </a:solidFill>
+                <a:latin typeface="Arial" panose="020B0604020202020204" pitchFamily="34" charset="0"/>
+                <a:ea typeface="MS PGothic" panose="020B0600070205080204" pitchFamily="34" charset="-128"/>
+                <a:cs typeface="+mn-cs"/>
+              </a:defRPr>
+            </a:lvl9pPr>
+          </a:lstStyle>
+          <a:p>
+            <a:pPr algn="ctr" eaLnBrk="1" hangingPunct="1"/>
+            <a:r>
+              <a:rPr lang="en-US" altLang="en-US" sz="2000" b="1" i="1" dirty="0" smtClean="0"/>
+              <a:t>Block-pushing video </a:t>
+            </a:r>
+            <a:endParaRPr lang="en-US" altLang="en-US" sz="2000" dirty="0"/>
           </a:p>
         </p:txBody>
       </p:sp>

</xml_diff>

<commit_message>
adding new flip part
</commit_message>
<xml_diff>
--- a/Presentations/Poster-Dallas.pptx
+++ b/Presentations/Poster-Dallas.pptx
@@ -106,7 +106,7 @@
   </p:defaultTextStyle>
   <p:extLst>
     <p:ext uri="{EFAFB233-063F-42B5-8137-9DF3F51BA10A}">
-      <p15:sldGuideLst xmlns:p15="http://schemas.microsoft.com/office/powerpoint/2012/main" xmlns="">
+      <p15:sldGuideLst xmlns="" xmlns:p15="http://schemas.microsoft.com/office/powerpoint/2012/main">
         <p15:guide id="1" orient="horz" pos="10368">
           <p15:clr>
             <a:srgbClr val="A4A3A4"/>
@@ -4499,10 +4499,6 @@
               </a:rPr>
               <a:t>/micro robots</a:t>
             </a:r>
-            <a:endParaRPr lang="en-US" sz="4000" dirty="0" smtClean="0">
-              <a:latin typeface="Arial"/>
-              <a:cs typeface="Arial"/>
-            </a:endParaRPr>
           </a:p>
         </p:txBody>
       </p:sp>
@@ -4534,64 +4530,39 @@
                 <a:latin typeface="Arial"/>
                 <a:cs typeface="Arial"/>
               </a:rPr>
-              <a:t>(1) </a:t>
+              <a:t>(1) Controlling </a:t>
+            </a:r>
+            <a:r>
+              <a:rPr lang="en-US" sz="4000" b="1" i="1" dirty="0" smtClean="0">
+                <a:latin typeface="Arial"/>
+                <a:cs typeface="Arial"/>
+              </a:rPr>
+              <a:t>mean position </a:t>
             </a:r>
             <a:r>
               <a:rPr lang="en-US" sz="4000" b="1" dirty="0" smtClean="0">
                 <a:latin typeface="Arial"/>
                 <a:cs typeface="Arial"/>
               </a:rPr>
-              <a:t>Controlling </a:t>
-            </a:r>
-            <a:r>
-              <a:rPr lang="en-US" sz="4000" b="1" i="1" dirty="0" smtClean="0">
-                <a:latin typeface="Arial"/>
-                <a:cs typeface="Arial"/>
-              </a:rPr>
-              <a:t>mean </a:t>
-            </a:r>
-            <a:r>
-              <a:rPr lang="en-US" sz="4000" b="1" i="1" dirty="0" smtClean="0">
-                <a:latin typeface="Arial"/>
-                <a:cs typeface="Arial"/>
-              </a:rPr>
-              <a:t>position </a:t>
+              <a:t>of </a:t>
+            </a:r>
+          </a:p>
+          <a:p>
+            <a:pPr algn="ctr"/>
+            <a:r>
+              <a:rPr lang="en-US" sz="4000" b="1" dirty="0">
+                <a:latin typeface="Arial"/>
+                <a:cs typeface="Arial"/>
+              </a:rPr>
+              <a:t>2</a:t>
             </a:r>
             <a:r>
               <a:rPr lang="en-US" sz="4000" b="1" dirty="0" smtClean="0">
                 <a:latin typeface="Arial"/>
                 <a:cs typeface="Arial"/>
               </a:rPr>
-              <a:t>of </a:t>
-            </a:r>
-          </a:p>
-          <a:p>
-            <a:pPr algn="ctr"/>
-            <a:r>
-              <a:rPr lang="en-US" sz="4000" b="1" dirty="0">
-                <a:latin typeface="Arial"/>
-                <a:cs typeface="Arial"/>
-              </a:rPr>
-              <a:t>2</a:t>
-            </a:r>
-            <a:r>
-              <a:rPr lang="en-US" sz="4000" b="1" dirty="0" smtClean="0">
-                <a:latin typeface="Arial"/>
-                <a:cs typeface="Arial"/>
-              </a:rPr>
-              <a:t>00 robots with different </a:t>
-            </a:r>
-            <a:r>
-              <a:rPr lang="en-US" sz="4000" b="1" dirty="0" smtClean="0">
-                <a:latin typeface="Arial"/>
-                <a:cs typeface="Arial"/>
-              </a:rPr>
-              <a:t>gain settings</a:t>
-            </a:r>
-            <a:endParaRPr lang="en-US" sz="4000" b="1" dirty="0" smtClean="0">
-              <a:latin typeface="Arial"/>
-              <a:cs typeface="Arial"/>
-            </a:endParaRPr>
+              <a:t>00 robots with different gain settings</a:t>
+            </a:r>
           </a:p>
           <a:p>
             <a:pPr algn="ctr"/>
@@ -4645,45 +4616,24 @@
                 <a:latin typeface="Arial"/>
                 <a:cs typeface="Arial"/>
               </a:rPr>
-              <a:t>increase the response</a:t>
+              <a:t>increase the response,</a:t>
+            </a:r>
+          </a:p>
+          <a:p>
+            <a:pPr marL="190500"/>
+            <a:r>
+              <a:rPr lang="en-US" sz="4000" dirty="0">
+                <a:latin typeface="Arial"/>
+                <a:cs typeface="Arial"/>
+              </a:rPr>
+              <a:t> </a:t>
             </a:r>
             <a:r>
               <a:rPr lang="en-US" sz="4000" dirty="0" smtClean="0">
                 <a:latin typeface="Arial"/>
                 <a:cs typeface="Arial"/>
               </a:rPr>
-              <a:t>,</a:t>
-            </a:r>
-          </a:p>
-          <a:p>
-            <a:pPr marL="190500"/>
-            <a:r>
-              <a:rPr lang="en-US" sz="4000" dirty="0">
-                <a:latin typeface="Arial"/>
-                <a:cs typeface="Arial"/>
-              </a:rPr>
-              <a:t> </a:t>
-            </a:r>
-            <a:r>
-              <a:rPr lang="en-US" sz="4000" dirty="0" smtClean="0">
-                <a:latin typeface="Arial"/>
-                <a:cs typeface="Arial"/>
-              </a:rPr>
-              <a:t> </a:t>
-            </a:r>
-            <a:r>
-              <a:rPr lang="en-US" sz="4000" dirty="0" smtClean="0">
-                <a:latin typeface="Arial"/>
-                <a:cs typeface="Arial"/>
-              </a:rPr>
-              <a:t> </a:t>
-            </a:r>
-            <a:r>
-              <a:rPr lang="en-US" sz="4000" dirty="0" smtClean="0">
-                <a:latin typeface="Arial"/>
-                <a:cs typeface="Arial"/>
-              </a:rPr>
-              <a:t>but also increase overshoot</a:t>
+              <a:t>  but also increase overshoot</a:t>
             </a:r>
           </a:p>
           <a:p>
@@ -4733,10 +4683,6 @@
               </a:rPr>
               <a:t>reduce overshoot, </a:t>
             </a:r>
-            <a:endParaRPr lang="en-US" sz="4000" dirty="0" smtClean="0">
-              <a:latin typeface="Arial"/>
-              <a:cs typeface="Arial"/>
-            </a:endParaRPr>
           </a:p>
           <a:p>
             <a:pPr marL="190500"/>
@@ -4752,21 +4698,7 @@
                 <a:latin typeface="Arial"/>
                 <a:cs typeface="Arial"/>
               </a:rPr>
-              <a:t>  </a:t>
-            </a:r>
-            <a:r>
-              <a:rPr lang="en-US" sz="4000" dirty="0" smtClean="0">
-                <a:latin typeface="Arial"/>
-                <a:cs typeface="Arial"/>
-              </a:rPr>
-              <a:t>but </a:t>
-            </a:r>
-            <a:r>
-              <a:rPr lang="en-US" sz="4000" dirty="0" smtClean="0">
-                <a:latin typeface="Arial"/>
-                <a:cs typeface="Arial"/>
-              </a:rPr>
-              <a:t>slow the response</a:t>
+              <a:t>  but slow the response</a:t>
             </a:r>
           </a:p>
         </p:txBody>
@@ -5379,19 +5311,8 @@
                 <a:latin typeface="Arial"/>
                 <a:cs typeface="Arial"/>
               </a:rPr>
-              <a:t>o to corners if variance is bigger than </a:t>
-            </a:r>
-            <a:r>
-              <a:rPr lang="en-US" sz="4000" dirty="0" smtClean="0">
-                <a:latin typeface="Arial"/>
-                <a:cs typeface="Arial"/>
-              </a:rPr>
-              <a:t>max</a:t>
-            </a:r>
-            <a:endParaRPr lang="en-US" sz="4000" dirty="0" smtClean="0">
-              <a:latin typeface="Arial"/>
-              <a:cs typeface="Arial"/>
-            </a:endParaRPr>
+              <a:t>o to corners if variance is bigger than max</a:t>
+            </a:r>
           </a:p>
           <a:p>
             <a:pPr marL="571500" indent="-571500">
@@ -5774,21 +5695,7 @@
                 <a:latin typeface="Arial"/>
                 <a:cs typeface="Arial"/>
               </a:rPr>
-              <a:t>Swarm Piano </a:t>
-            </a:r>
-            <a:r>
-              <a:rPr lang="en-US" sz="2000" b="1" i="1" dirty="0" smtClean="0">
-                <a:latin typeface="Arial"/>
-                <a:cs typeface="Arial"/>
-              </a:rPr>
-              <a:t>Mover’s </a:t>
-            </a:r>
-            <a:r>
-              <a:rPr lang="en-US" sz="2000" b="1" i="1" dirty="0" smtClean="0">
-                <a:latin typeface="Arial"/>
-                <a:cs typeface="Arial"/>
-              </a:rPr>
-              <a:t>video</a:t>
+              <a:t>Swarm Piano Mover’s video</a:t>
             </a:r>
             <a:endParaRPr lang="en-US" sz="2000" dirty="0">
               <a:latin typeface="Arial"/>
@@ -5872,7 +5779,7 @@
         </p:blipFill>
         <p:spPr>
           <a:xfrm>
-            <a:off x="29250879" y="33490701"/>
+            <a:off x="29250879" y="34539037"/>
             <a:ext cx="7326801" cy="7071526"/>
           </a:xfrm>
           <a:prstGeom prst="rect">
@@ -6329,7 +6236,7 @@
         </p:blipFill>
         <p:spPr>
           <a:xfrm>
-            <a:off x="5321203" y="33675437"/>
+            <a:off x="190403" y="34539037"/>
             <a:ext cx="7269963" cy="7071526"/>
           </a:xfrm>
           <a:prstGeom prst="rect">
@@ -6439,49 +6346,21 @@
                 <a:latin typeface="Arial"/>
                 <a:cs typeface="Arial"/>
               </a:rPr>
-              <a:t>: push </a:t>
+              <a:t>: push a block </a:t>
+            </a:r>
+            <a:r>
+              <a:rPr lang="en-US" sz="4000" dirty="0">
+                <a:latin typeface="Arial"/>
+                <a:cs typeface="Arial"/>
+              </a:rPr>
+              <a:t>through a </a:t>
             </a:r>
             <a:r>
               <a:rPr lang="en-US" sz="4000" dirty="0" smtClean="0">
                 <a:latin typeface="Arial"/>
                 <a:cs typeface="Arial"/>
               </a:rPr>
-              <a:t>a block </a:t>
-            </a:r>
-            <a:r>
-              <a:rPr lang="en-US" sz="4000" dirty="0">
-                <a:latin typeface="Arial"/>
-                <a:cs typeface="Arial"/>
-              </a:rPr>
-              <a:t>through a </a:t>
-            </a:r>
-            <a:r>
-              <a:rPr lang="en-US" sz="4000" dirty="0" smtClean="0">
-                <a:latin typeface="Arial"/>
-                <a:cs typeface="Arial"/>
-              </a:rPr>
-              <a:t>maze using a </a:t>
-            </a:r>
-            <a:r>
-              <a:rPr lang="en-US" sz="4000" dirty="0" smtClean="0">
-                <a:latin typeface="Arial"/>
-                <a:cs typeface="Arial"/>
-              </a:rPr>
-              <a:t>swarm </a:t>
-            </a:r>
-            <a:r>
-              <a:rPr lang="en-US" sz="4000" dirty="0" smtClean="0">
-                <a:latin typeface="Arial"/>
-                <a:cs typeface="Arial"/>
-              </a:rPr>
-              <a:t>of robots </a:t>
-            </a:r>
-            <a:r>
-              <a:rPr lang="en-US" sz="4000" dirty="0" smtClean="0">
-                <a:latin typeface="Arial"/>
-                <a:cs typeface="Arial"/>
-              </a:rPr>
-              <a:t>with </a:t>
+              <a:t>maze using a swarm of robots with </a:t>
             </a:r>
             <a:r>
               <a:rPr lang="en-US" sz="4000" i="1" dirty="0" smtClean="0">
@@ -6490,10 +6369,6 @@
               </a:rPr>
               <a:t>global inputs</a:t>
             </a:r>
-            <a:endParaRPr lang="en-US" sz="4000" i="1" dirty="0" smtClean="0">
-              <a:latin typeface="Arial"/>
-              <a:cs typeface="Arial"/>
-            </a:endParaRPr>
           </a:p>
           <a:p>
             <a:endParaRPr lang="en-US" sz="4000" dirty="0" smtClean="0">
@@ -6511,21 +6386,7 @@
                 <a:latin typeface="Arial"/>
                 <a:cs typeface="Arial"/>
               </a:rPr>
-              <a:t>All </a:t>
-            </a:r>
-            <a:r>
-              <a:rPr lang="en-US" sz="4000" dirty="0" smtClean="0">
-                <a:latin typeface="Arial"/>
-                <a:cs typeface="Arial"/>
-              </a:rPr>
-              <a:t>robots </a:t>
-            </a:r>
-            <a:r>
-              <a:rPr lang="en-US" sz="4000" dirty="0" smtClean="0">
-                <a:latin typeface="Arial"/>
-                <a:cs typeface="Arial"/>
-              </a:rPr>
-              <a:t>get the same global input and use hybrid hysteresis mean-variance control to reach the goal</a:t>
+              <a:t>All robots get the same global input and use hybrid hysteresis mean-variance control to reach the goal</a:t>
             </a:r>
           </a:p>
           <a:p>
@@ -6562,42 +6423,7 @@
                 <a:latin typeface="Arial"/>
                 <a:cs typeface="Arial"/>
               </a:rPr>
-              <a:t>to steer the swarm: aggregate behind </a:t>
-            </a:r>
-            <a:r>
-              <a:rPr lang="en-US" sz="4000" dirty="0" smtClean="0">
-                <a:latin typeface="Arial"/>
-                <a:cs typeface="Arial"/>
-              </a:rPr>
-              <a:t>the block </a:t>
-            </a:r>
-            <a:r>
-              <a:rPr lang="en-US" sz="4000" dirty="0" smtClean="0">
-                <a:latin typeface="Arial"/>
-                <a:cs typeface="Arial"/>
-              </a:rPr>
-              <a:t>to </a:t>
-            </a:r>
-            <a:r>
-              <a:rPr lang="en-US" sz="4000" dirty="0" smtClean="0">
-                <a:latin typeface="Arial"/>
-                <a:cs typeface="Arial"/>
-              </a:rPr>
-              <a:t>push </a:t>
-            </a:r>
-            <a:r>
-              <a:rPr lang="en-US" sz="4000" dirty="0" smtClean="0">
-                <a:latin typeface="Arial"/>
-                <a:cs typeface="Arial"/>
-              </a:rPr>
-              <a:t>the block </a:t>
-            </a:r>
-            <a:r>
-              <a:rPr lang="en-US" sz="4000" dirty="0" smtClean="0">
-                <a:latin typeface="Arial"/>
-                <a:cs typeface="Arial"/>
-              </a:rPr>
-              <a:t>forward</a:t>
+              <a:t>to steer the swarm: aggregate behind the block to push the block forward</a:t>
             </a:r>
           </a:p>
           <a:p>
@@ -6639,21 +6465,7 @@
                 <a:latin typeface="Arial"/>
                 <a:cs typeface="Arial"/>
               </a:rPr>
-              <a:t>Bread-first search </a:t>
-            </a:r>
-            <a:r>
-              <a:rPr lang="en-US" sz="4000" dirty="0" smtClean="0">
-                <a:latin typeface="Arial"/>
-                <a:cs typeface="Arial"/>
-              </a:rPr>
-              <a:t>(BFS) to </a:t>
-            </a:r>
-            <a:r>
-              <a:rPr lang="en-US" sz="4000" dirty="0" smtClean="0">
-                <a:latin typeface="Arial"/>
-                <a:cs typeface="Arial"/>
-              </a:rPr>
-              <a:t>find the shortest path from starting point     to the    goal </a:t>
+              <a:t>Bread-first search (BFS) to find the shortest path from starting point     to the    goal </a:t>
             </a:r>
             <a:endParaRPr lang="en-US" sz="4000" dirty="0">
               <a:latin typeface="Arial"/>
@@ -6670,7 +6482,7 @@
         </p:nvSpPr>
         <p:spPr>
           <a:xfrm>
-            <a:off x="13143559" y="36649485"/>
+            <a:off x="8012759" y="37513085"/>
             <a:ext cx="6509015" cy="2554545"/>
           </a:xfrm>
           <a:prstGeom prst="rect">
@@ -6762,7 +6574,7 @@
         </p:nvSpPr>
         <p:spPr>
           <a:xfrm>
-            <a:off x="37132355" y="33490701"/>
+            <a:off x="37132355" y="34539037"/>
             <a:ext cx="6009711" cy="1591468"/>
           </a:xfrm>
           <a:prstGeom prst="rect">
@@ -6818,7 +6630,7 @@
         </p:nvSpPr>
         <p:spPr>
           <a:xfrm>
-            <a:off x="13160129" y="33765076"/>
+            <a:off x="8029329" y="34628676"/>
             <a:ext cx="6009711" cy="1591468"/>
           </a:xfrm>
           <a:prstGeom prst="rect">
@@ -6922,7 +6734,7 @@
         </p:nvSpPr>
         <p:spPr>
           <a:xfrm>
-            <a:off x="37132355" y="36361343"/>
+            <a:off x="37132355" y="37224943"/>
             <a:ext cx="6509015" cy="3170099"/>
           </a:xfrm>
           <a:prstGeom prst="rect">
@@ -6941,21 +6753,7 @@
                 <a:latin typeface="Arial"/>
                 <a:cs typeface="Arial"/>
               </a:rPr>
-              <a:t>In this experiment, 200 robots push the black block in the maze to the goal, by controlling </a:t>
-            </a:r>
-            <a:r>
-              <a:rPr lang="en-US" sz="4000" dirty="0" smtClean="0">
-                <a:latin typeface="Arial"/>
-                <a:cs typeface="Arial"/>
-              </a:rPr>
-              <a:t>the swarm mean </a:t>
-            </a:r>
-            <a:r>
-              <a:rPr lang="en-US" sz="4000" dirty="0" smtClean="0">
-                <a:latin typeface="Arial"/>
-                <a:cs typeface="Arial"/>
-              </a:rPr>
-              <a:t>and variance</a:t>
+              <a:t>In this experiment, 200 robots push the black block in the maze to the goal, by controlling the swarm mean and variance</a:t>
             </a:r>
             <a:endParaRPr lang="en-US" sz="4000" dirty="0">
               <a:latin typeface="Arial"/>
@@ -6980,7 +6778,7 @@
         </p:blipFill>
         <p:spPr>
           <a:xfrm>
-            <a:off x="16247382" y="38608967"/>
+            <a:off x="11109616" y="39511634"/>
             <a:ext cx="533400" cy="508000"/>
           </a:xfrm>
           <a:prstGeom prst="rect">
@@ -7004,7 +6802,7 @@
         </p:blipFill>
         <p:spPr>
           <a:xfrm>
-            <a:off x="18482648" y="38621667"/>
+            <a:off x="13336783" y="39523367"/>
             <a:ext cx="482600" cy="495300"/>
           </a:xfrm>
           <a:prstGeom prst="rect">
@@ -7119,7 +6917,7 @@
         </p:nvSpPr>
         <p:spPr>
           <a:xfrm rot="10800000" flipH="1">
-            <a:off x="41301927" y="39491897"/>
+            <a:off x="41301927" y="40355497"/>
             <a:ext cx="1847008" cy="1070330"/>
           </a:xfrm>
           <a:prstGeom prst="snip1Rect">
@@ -7176,7 +6974,7 @@
         </p:nvSpPr>
         <p:spPr>
           <a:xfrm>
-            <a:off x="41532150" y="39491897"/>
+            <a:off x="41532150" y="40253897"/>
             <a:ext cx="1847009" cy="1015663"/>
           </a:xfrm>
           <a:prstGeom prst="rect">
@@ -7218,7 +7016,7 @@
         </p:nvSpPr>
         <p:spPr>
           <a:xfrm rot="10800000" flipH="1">
-            <a:off x="17322832" y="39676633"/>
+            <a:off x="12192032" y="40489433"/>
             <a:ext cx="1847008" cy="1070330"/>
           </a:xfrm>
           <a:prstGeom prst="snip1Rect">
@@ -7275,7 +7073,7 @@
         </p:nvSpPr>
         <p:spPr>
           <a:xfrm>
-            <a:off x="17559143" y="39676633"/>
+            <a:off x="12415902" y="40540233"/>
             <a:ext cx="1847009" cy="1015663"/>
           </a:xfrm>
           <a:prstGeom prst="rect">
@@ -7351,29 +7149,18 @@
                 <a:latin typeface="Arial"/>
                 <a:cs typeface="Arial"/>
               </a:rPr>
-              <a:t> </a:t>
-            </a:r>
+              <a:t> by </a:t>
+            </a:r>
+          </a:p>
+          <a:p>
+            <a:pPr algn="ctr"/>
             <a:r>
               <a:rPr lang="en-US" sz="4000" b="1" dirty="0" smtClean="0">
                 <a:latin typeface="Arial"/>
                 <a:cs typeface="Arial"/>
               </a:rPr>
-              <a:t>by </a:t>
-            </a:r>
-          </a:p>
-          <a:p>
-            <a:pPr algn="ctr"/>
-            <a:r>
-              <a:rPr lang="en-US" sz="4000" b="1" dirty="0" smtClean="0">
-                <a:latin typeface="Arial"/>
-                <a:cs typeface="Arial"/>
-              </a:rPr>
               <a:t>exploiting Brownian noise</a:t>
             </a:r>
-            <a:endParaRPr lang="en-US" sz="4000" b="1" dirty="0" smtClean="0">
-              <a:latin typeface="Arial"/>
-              <a:cs typeface="Arial"/>
-            </a:endParaRPr>
           </a:p>
           <a:p>
             <a:r>
@@ -7395,51 +7182,30 @@
                 <a:latin typeface="Arial"/>
                 <a:cs typeface="Arial"/>
               </a:rPr>
-              <a:t> </a:t>
-            </a:r>
+              <a:t> to increase variance</a:t>
+            </a:r>
+          </a:p>
+          <a:p>
             <a:r>
               <a:rPr lang="en-US" sz="4000" dirty="0" smtClean="0">
                 <a:latin typeface="Arial"/>
                 <a:cs typeface="Arial"/>
               </a:rPr>
-              <a:t>to increase variance</a:t>
-            </a:r>
-          </a:p>
-          <a:p>
+              <a:t>and </a:t>
+            </a:r>
+            <a:r>
+              <a:rPr lang="en-US" sz="4000" i="1" dirty="0" smtClean="0">
+                <a:latin typeface="Arial"/>
+                <a:cs typeface="Arial"/>
+              </a:rPr>
+              <a:t>go to corners </a:t>
+            </a:r>
             <a:r>
               <a:rPr lang="en-US" sz="4000" dirty="0" smtClean="0">
                 <a:latin typeface="Arial"/>
                 <a:cs typeface="Arial"/>
               </a:rPr>
-              <a:t>and </a:t>
-            </a:r>
-            <a:r>
-              <a:rPr lang="en-US" sz="4000" i="1" dirty="0" smtClean="0">
-                <a:latin typeface="Arial"/>
-                <a:cs typeface="Arial"/>
-              </a:rPr>
-              <a:t>go to </a:t>
-            </a:r>
-            <a:r>
-              <a:rPr lang="en-US" sz="4000" i="1" dirty="0" smtClean="0">
-                <a:latin typeface="Arial"/>
-                <a:cs typeface="Arial"/>
-              </a:rPr>
-              <a:t>corners </a:t>
-            </a:r>
-            <a:r>
-              <a:rPr lang="en-US" sz="4000" dirty="0" smtClean="0">
-                <a:latin typeface="Arial"/>
-                <a:cs typeface="Arial"/>
-              </a:rPr>
-              <a:t>to decrease </a:t>
-            </a:r>
-            <a:r>
-              <a:rPr lang="en-US" sz="4000" dirty="0" smtClean="0">
-                <a:latin typeface="Arial"/>
-                <a:cs typeface="Arial"/>
-              </a:rPr>
-              <a:t>variance</a:t>
+              <a:t>to decrease variance</a:t>
             </a:r>
           </a:p>
         </p:txBody>
@@ -7664,6 +7430,284 @@
           </a:p>
         </p:txBody>
       </p:sp>
+      <p:sp>
+        <p:nvSpPr>
+          <p:cNvPr id="65" name="Rectangle 64"/>
+          <p:cNvSpPr/>
+          <p:nvPr/>
+        </p:nvSpPr>
+        <p:spPr>
+          <a:xfrm>
+            <a:off x="22741864" y="34614467"/>
+            <a:ext cx="6009711" cy="1591468"/>
+          </a:xfrm>
+          <a:prstGeom prst="rect">
+            <a:avLst/>
+          </a:prstGeom>
+          <a:solidFill>
+            <a:srgbClr val="FF0000"/>
+          </a:solidFill>
+          <a:ln>
+            <a:solidFill>
+              <a:srgbClr val="FF0000"/>
+            </a:solidFill>
+          </a:ln>
+        </p:spPr>
+        <p:style>
+          <a:lnRef idx="1">
+            <a:schemeClr val="accent1"/>
+          </a:lnRef>
+          <a:fillRef idx="3">
+            <a:schemeClr val="accent1"/>
+          </a:fillRef>
+          <a:effectRef idx="2">
+            <a:schemeClr val="accent1"/>
+          </a:effectRef>
+          <a:fontRef idx="minor">
+            <a:schemeClr val="lt1"/>
+          </a:fontRef>
+        </p:style>
+        <p:txBody>
+          <a:bodyPr rtlCol="0" anchor="ctr"/>
+          <a:lstStyle/>
+          <a:p>
+            <a:pPr algn="ctr"/>
+            <a:r>
+              <a:rPr lang="en-US" sz="7000" dirty="0" smtClean="0">
+                <a:latin typeface="Arial"/>
+                <a:cs typeface="Arial"/>
+              </a:rPr>
+              <a:t>Block Pushing</a:t>
+            </a:r>
+            <a:endParaRPr lang="en-US" sz="7000" dirty="0">
+              <a:latin typeface="Arial"/>
+              <a:cs typeface="Arial"/>
+            </a:endParaRPr>
+          </a:p>
+        </p:txBody>
+      </p:sp>
+      <p:sp>
+        <p:nvSpPr>
+          <p:cNvPr id="66" name="TextBox 65"/>
+          <p:cNvSpPr txBox="1"/>
+          <p:nvPr/>
+        </p:nvSpPr>
+        <p:spPr>
+          <a:xfrm>
+            <a:off x="22741864" y="37485109"/>
+            <a:ext cx="6509015" cy="2554545"/>
+          </a:xfrm>
+          <a:prstGeom prst="rect">
+            <a:avLst/>
+          </a:prstGeom>
+          <a:noFill/>
+        </p:spPr>
+        <p:txBody>
+          <a:bodyPr wrap="square" rtlCol="0">
+            <a:spAutoFit/>
+          </a:bodyPr>
+          <a:lstStyle/>
+          <a:p>
+            <a:r>
+              <a:rPr lang="en-US" sz="4000" dirty="0" smtClean="0">
+                <a:latin typeface="Arial"/>
+                <a:cs typeface="Arial"/>
+              </a:rPr>
+              <a:t>When </a:t>
+            </a:r>
+            <a:r>
+              <a:rPr lang="en-US" sz="4000" dirty="0">
+                <a:latin typeface="Arial"/>
+                <a:cs typeface="Arial"/>
+              </a:rPr>
+              <a:t>variance is bigger than maximum variance </a:t>
+            </a:r>
+            <a:r>
+              <a:rPr lang="en-US" sz="4000" dirty="0" smtClean="0">
+                <a:latin typeface="Arial"/>
+                <a:cs typeface="Arial"/>
+              </a:rPr>
+              <a:t>local </a:t>
+            </a:r>
+            <a:r>
+              <a:rPr lang="en-US" sz="4000" dirty="0" smtClean="0">
+                <a:latin typeface="Arial"/>
+                <a:cs typeface="Arial"/>
+              </a:rPr>
+              <a:t>goal is nearest corner to gather robots together</a:t>
+            </a:r>
+            <a:endParaRPr lang="en-US" sz="4000" dirty="0">
+              <a:latin typeface="Arial"/>
+              <a:cs typeface="Arial"/>
+            </a:endParaRPr>
+          </a:p>
+        </p:txBody>
+      </p:sp>
+      <p:sp>
+        <p:nvSpPr>
+          <p:cNvPr id="67" name="Snip Single Corner Rectangle 66"/>
+          <p:cNvSpPr/>
+          <p:nvPr/>
+        </p:nvSpPr>
+        <p:spPr>
+          <a:xfrm rot="10800000" flipH="1">
+            <a:off x="26911436" y="40615663"/>
+            <a:ext cx="1847008" cy="1070330"/>
+          </a:xfrm>
+          <a:prstGeom prst="snip1Rect">
+            <a:avLst>
+              <a:gd name="adj" fmla="val 34180"/>
+            </a:avLst>
+          </a:prstGeom>
+          <a:solidFill>
+            <a:srgbClr val="FF0000"/>
+          </a:solidFill>
+          <a:ln>
+            <a:solidFill>
+              <a:srgbClr val="FF0000"/>
+            </a:solidFill>
+          </a:ln>
+          <a:scene3d>
+            <a:camera prst="orthographicFront">
+              <a:rot lat="0" lon="0" rev="0"/>
+            </a:camera>
+            <a:lightRig rig="threePt" dir="t"/>
+          </a:scene3d>
+          <a:sp3d/>
+        </p:spPr>
+        <p:style>
+          <a:lnRef idx="1">
+            <a:schemeClr val="accent1"/>
+          </a:lnRef>
+          <a:fillRef idx="3">
+            <a:schemeClr val="accent1"/>
+          </a:fillRef>
+          <a:effectRef idx="2">
+            <a:schemeClr val="accent1"/>
+          </a:effectRef>
+          <a:fontRef idx="minor">
+            <a:schemeClr val="lt1"/>
+          </a:fontRef>
+        </p:style>
+        <p:txBody>
+          <a:bodyPr rtlCol="0" anchor="ctr">
+            <a:flatTx/>
+          </a:bodyPr>
+          <a:lstStyle/>
+          <a:p>
+            <a:pPr algn="ctr"/>
+            <a:endParaRPr lang="en-US" sz="5000" dirty="0"/>
+          </a:p>
+        </p:txBody>
+      </p:sp>
+      <p:sp>
+        <p:nvSpPr>
+          <p:cNvPr id="68" name="TextBox 67"/>
+          <p:cNvSpPr txBox="1"/>
+          <p:nvPr/>
+        </p:nvSpPr>
+        <p:spPr>
+          <a:xfrm>
+            <a:off x="27141659" y="40564863"/>
+            <a:ext cx="1847009" cy="1015663"/>
+          </a:xfrm>
+          <a:prstGeom prst="rect">
+            <a:avLst/>
+          </a:prstGeom>
+          <a:noFill/>
+        </p:spPr>
+        <p:txBody>
+          <a:bodyPr wrap="square" rtlCol="0">
+            <a:spAutoFit/>
+          </a:bodyPr>
+          <a:lstStyle/>
+          <a:p>
+            <a:r>
+              <a:rPr lang="en-US" sz="6000" dirty="0" smtClean="0">
+                <a:solidFill>
+                  <a:schemeClr val="bg1"/>
+                </a:solidFill>
+                <a:latin typeface="Arial"/>
+                <a:cs typeface="Arial"/>
+              </a:rPr>
+              <a:t>Flip</a:t>
+            </a:r>
+            <a:endParaRPr lang="en-US" sz="6000" dirty="0">
+              <a:solidFill>
+                <a:schemeClr val="bg1"/>
+              </a:solidFill>
+              <a:latin typeface="Arial"/>
+              <a:cs typeface="Arial"/>
+            </a:endParaRPr>
+          </a:p>
+        </p:txBody>
+      </p:sp>
+      <p:pic>
+        <p:nvPicPr>
+          <p:cNvPr id="2" name="Picture 1" descr="Corner.png"/>
+          <p:cNvPicPr>
+            <a:picLocks noChangeAspect="1"/>
+          </p:cNvPicPr>
+          <p:nvPr/>
+        </p:nvPicPr>
+        <p:blipFill>
+          <a:blip r:embed="rId27">
+            <a:extLst>
+              <a:ext uri="{28A0092B-C50C-407E-A947-70E740481C1C}">
+                <a14:useLocalDpi xmlns:a14="http://schemas.microsoft.com/office/drawing/2010/main" val="0"/>
+              </a:ext>
+            </a:extLst>
+          </a:blip>
+          <a:stretch>
+            <a:fillRect/>
+          </a:stretch>
+        </p:blipFill>
+        <p:spPr>
+          <a:xfrm>
+            <a:off x="14863192" y="34539037"/>
+            <a:ext cx="7323997" cy="7146956"/>
+          </a:xfrm>
+          <a:prstGeom prst="rect">
+            <a:avLst/>
+          </a:prstGeom>
+        </p:spPr>
+      </p:pic>
+      <p:cxnSp>
+        <p:nvCxnSpPr>
+          <p:cNvPr id="11" name="Straight Connector 10"/>
+          <p:cNvCxnSpPr/>
+          <p:nvPr/>
+        </p:nvCxnSpPr>
+        <p:spPr>
+          <a:xfrm flipH="1">
+            <a:off x="1" y="32918400"/>
+            <a:ext cx="43891199" cy="0"/>
+          </a:xfrm>
+          <a:prstGeom prst="line">
+            <a:avLst/>
+          </a:prstGeom>
+          <a:ln>
+            <a:solidFill>
+              <a:srgbClr val="FF0000"/>
+            </a:solidFill>
+            <a:prstDash val="sysDot"/>
+          </a:ln>
+        </p:spPr>
+        <p:style>
+          <a:lnRef idx="2">
+            <a:schemeClr val="accent1"/>
+          </a:lnRef>
+          <a:fillRef idx="0">
+            <a:schemeClr val="accent1"/>
+          </a:fillRef>
+          <a:effectRef idx="1">
+            <a:schemeClr val="accent1"/>
+          </a:effectRef>
+          <a:fontRef idx="minor">
+            <a:schemeClr val="tx1"/>
+          </a:fontRef>
+        </p:style>
+      </p:cxnSp>
     </p:spTree>
     <p:extLst>
       <p:ext uri="{BB962C8B-B14F-4D97-AF65-F5344CB8AC3E}">

</xml_diff>

<commit_message>
Changed middle flip text
</commit_message>
<xml_diff>
--- a/Presentations/Poster-Dallas.pptx
+++ b/Presentations/Poster-Dallas.pptx
@@ -106,7 +106,7 @@
   </p:defaultTextStyle>
   <p:extLst>
     <p:ext uri="{EFAFB233-063F-42B5-8137-9DF3F51BA10A}">
-      <p15:sldGuideLst xmlns="" xmlns:p15="http://schemas.microsoft.com/office/powerpoint/2012/main">
+      <p15:sldGuideLst xmlns:p15="http://schemas.microsoft.com/office/powerpoint/2012/main" xmlns="">
         <p15:guide id="1" orient="horz" pos="10368">
           <p15:clr>
             <a:srgbClr val="A4A3A4"/>
@@ -7494,8 +7494,8 @@
         </p:nvSpPr>
         <p:spPr>
           <a:xfrm>
-            <a:off x="22741864" y="37485109"/>
-            <a:ext cx="6509015" cy="2554545"/>
+            <a:off x="22741865" y="37485109"/>
+            <a:ext cx="6150966" cy="2554545"/>
           </a:xfrm>
           <a:prstGeom prst="rect">
             <a:avLst/>
@@ -7513,28 +7513,35 @@
                 <a:latin typeface="Arial"/>
                 <a:cs typeface="Arial"/>
               </a:rPr>
-              <a:t>When </a:t>
+              <a:t>If variance </a:t>
             </a:r>
             <a:r>
               <a:rPr lang="en-US" sz="4000" dirty="0">
                 <a:latin typeface="Arial"/>
                 <a:cs typeface="Arial"/>
               </a:rPr>
-              <a:t>variance is bigger than maximum variance </a:t>
+              <a:t>is </a:t>
             </a:r>
             <a:r>
               <a:rPr lang="en-US" sz="4000" dirty="0" smtClean="0">
                 <a:latin typeface="Arial"/>
                 <a:cs typeface="Arial"/>
               </a:rPr>
-              <a:t>local </a:t>
+              <a:t>larger than the desired maximum, we direct swarm to nearest </a:t>
             </a:r>
             <a:r>
               <a:rPr lang="en-US" sz="4000" dirty="0" smtClean="0">
                 <a:latin typeface="Arial"/>
                 <a:cs typeface="Arial"/>
               </a:rPr>
-              <a:t>goal is nearest corner to gather robots together</a:t>
+              <a:t>corner to </a:t>
+            </a:r>
+            <a:r>
+              <a:rPr lang="en-US" sz="4000" dirty="0" smtClean="0">
+                <a:latin typeface="Arial"/>
+                <a:cs typeface="Arial"/>
+              </a:rPr>
+              <a:t>gather robots </a:t>
             </a:r>
             <a:endParaRPr lang="en-US" sz="4000" dirty="0">
               <a:latin typeface="Arial"/>

</xml_diff>

<commit_message>
Made a backup copy of the submitted version
Also deleted unused pictures to clean up svn
</commit_message>
<xml_diff>
--- a/Presentations/Poster-Dallas.pptx
+++ b/Presentations/Poster-Dallas.pptx
@@ -106,7 +106,7 @@
   </p:defaultTextStyle>
   <p:extLst>
     <p:ext uri="{EFAFB233-063F-42B5-8137-9DF3F51BA10A}">
-      <p15:sldGuideLst xmlns:p15="http://schemas.microsoft.com/office/powerpoint/2012/main" xmlns="">
+      <p15:sldGuideLst xmlns="" xmlns:p15="http://schemas.microsoft.com/office/powerpoint/2012/main">
         <p15:guide id="1" orient="horz" pos="10368">
           <p15:clr>
             <a:srgbClr val="A4A3A4"/>
@@ -4511,7 +4511,7 @@
         <p:spPr>
           <a:xfrm>
             <a:off x="15328551" y="10430461"/>
-            <a:ext cx="13317993" cy="4401205"/>
+            <a:ext cx="12396833" cy="4401205"/>
           </a:xfrm>
           <a:prstGeom prst="rect">
             <a:avLst/>
@@ -5258,7 +5258,7 @@
         <p:spPr>
           <a:xfrm>
             <a:off x="15328552" y="29670334"/>
-            <a:ext cx="13033230" cy="2554545"/>
+            <a:ext cx="12270638" cy="2554545"/>
           </a:xfrm>
           <a:prstGeom prst="rect">
             <a:avLst/>
@@ -7116,7 +7116,7 @@
         <p:spPr>
           <a:xfrm>
             <a:off x="15621631" y="19609355"/>
-            <a:ext cx="12740152" cy="2554545"/>
+            <a:ext cx="11977559" cy="2554545"/>
           </a:xfrm>
           <a:prstGeom prst="rect">
             <a:avLst/>

</xml_diff>